<commit_message>
Update presentation with latest slides
</commit_message>
<xml_diff>
--- a/Intro To RAG.pptx
+++ b/Intro To RAG.pptx
@@ -20,11 +20,11 @@
     <p:sldId id="329" r:id="rId11"/>
     <p:sldId id="343" r:id="rId12"/>
     <p:sldId id="333" r:id="rId13"/>
-    <p:sldId id="334" r:id="rId14"/>
-    <p:sldId id="344" r:id="rId15"/>
-    <p:sldId id="336" r:id="rId16"/>
-    <p:sldId id="345" r:id="rId17"/>
-    <p:sldId id="338" r:id="rId18"/>
+    <p:sldId id="344" r:id="rId14"/>
+    <p:sldId id="336" r:id="rId15"/>
+    <p:sldId id="345" r:id="rId16"/>
+    <p:sldId id="338" r:id="rId17"/>
+    <p:sldId id="346" r:id="rId18"/>
     <p:sldId id="342" r:id="rId19"/>
   </p:sldIdLst>
   <p:sldSz cx="9144000" cy="5143500" type="screen16x9"/>
@@ -6805,42 +6805,12 @@
       </p:grpSpPr>
       <p:pic>
         <p:nvPicPr>
-          <p:cNvPr id="3" name="Picture 2" descr="A person in a suit&#10;&#10;Description automatically generated">
-            <a:extLst>
-              <a:ext uri="{FF2B5EF4-FFF2-40B4-BE49-F238E27FC236}">
-                <a16:creationId xmlns:a16="http://schemas.microsoft.com/office/drawing/2014/main" id="{B664D29C-20F2-5D0D-0742-8578123DC3D0}"/>
-              </a:ext>
-            </a:extLst>
-          </p:cNvPr>
-          <p:cNvPicPr>
-            <a:picLocks noChangeAspect="1"/>
-          </p:cNvPicPr>
-          <p:nvPr/>
-        </p:nvPicPr>
-        <p:blipFill>
-          <a:blip r:embed="rId3"/>
-          <a:stretch>
-            <a:fillRect/>
-          </a:stretch>
-        </p:blipFill>
-        <p:spPr>
-          <a:xfrm>
-            <a:off x="4288117" y="319721"/>
-            <a:ext cx="4557079" cy="4557079"/>
-          </a:xfrm>
-          <a:prstGeom prst="rect">
-            <a:avLst/>
-          </a:prstGeom>
-        </p:spPr>
-      </p:pic>
-      <p:pic>
-        <p:nvPicPr>
           <p:cNvPr id="89" name="Google Shape;89;p15"/>
           <p:cNvPicPr preferRelativeResize="0"/>
           <p:nvPr/>
         </p:nvPicPr>
         <p:blipFill rotWithShape="1">
-          <a:blip r:embed="rId4">
+          <a:blip r:embed="rId3">
             <a:alphaModFix/>
           </a:blip>
           <a:srcRect/>
@@ -6848,8 +6818,8 @@
         </p:blipFill>
         <p:spPr>
           <a:xfrm>
-            <a:off x="-25" y="0"/>
-            <a:ext cx="9144044" cy="5143501"/>
+            <a:off x="-22" y="-1"/>
+            <a:ext cx="9144022" cy="5143501"/>
           </a:xfrm>
           <a:prstGeom prst="rect">
             <a:avLst/>
@@ -6873,7 +6843,7 @@
         <p:spPr>
           <a:xfrm>
             <a:off x="277936" y="1740620"/>
-            <a:ext cx="4847100" cy="1736100"/>
+            <a:ext cx="4460319" cy="1736100"/>
           </a:xfrm>
           <a:prstGeom prst="rect">
             <a:avLst/>
@@ -6896,7 +6866,7 @@
             </a:pPr>
             <a:r>
               <a:rPr lang="en" sz="4333" dirty="0"/>
-              <a:t>Build Your Own ChatBot With The RAG Architecture</a:t>
+              <a:t>Build A ChatBot With RAG &amp; Gemini</a:t>
             </a:r>
             <a:endParaRPr sz="4333" dirty="0"/>
           </a:p>
@@ -6949,7 +6919,7 @@
                 <a:cs typeface="Google Sans"/>
                 <a:sym typeface="Google Sans"/>
               </a:rPr>
-              <a:t>Dubai</a:t>
+              <a:t>Sharjah</a:t>
             </a:r>
             <a:endParaRPr sz="100" dirty="0">
               <a:latin typeface="Google Sans"/>
@@ -6968,8 +6938,8 @@
         </p:nvSpPr>
         <p:spPr>
           <a:xfrm>
-            <a:off x="277936" y="3540699"/>
-            <a:ext cx="4372242" cy="769411"/>
+            <a:off x="298804" y="3796441"/>
+            <a:ext cx="4372242" cy="492412"/>
           </a:xfrm>
           <a:prstGeom prst="rect">
             <a:avLst/>
@@ -7004,62 +6974,41 @@
                 <a:cs typeface="Google Sans"/>
                 <a:sym typeface="Google Sans"/>
               </a:rPr>
-              <a:t>Rohan Mitra</a:t>
-            </a:r>
-          </a:p>
-          <a:p>
-            <a:pPr marL="0" lvl="0" indent="0" algn="l" rtl="0">
-              <a:spcBef>
-                <a:spcPts val="0"/>
-              </a:spcBef>
-              <a:spcAft>
-                <a:spcPts val="0"/>
-              </a:spcAft>
-              <a:buNone/>
-            </a:pPr>
-            <a:r>
-              <a:rPr lang="en" sz="900" dirty="0">
-                <a:solidFill>
-                  <a:schemeClr val="dk2"/>
-                </a:solidFill>
-                <a:latin typeface="Google Sans"/>
-                <a:ea typeface="Google Sans"/>
-                <a:cs typeface="Google Sans"/>
-                <a:sym typeface="Google Sans"/>
-              </a:rPr>
-              <a:t>ML Engineer @ Bayut | Dubizzle</a:t>
-            </a:r>
-          </a:p>
-          <a:p>
-            <a:pPr marL="0" lvl="0" indent="0" algn="l" rtl="0">
-              <a:spcBef>
-                <a:spcPts val="0"/>
-              </a:spcBef>
-              <a:spcAft>
-                <a:spcPts val="0"/>
-              </a:spcAft>
-              <a:buNone/>
-            </a:pPr>
-            <a:r>
-              <a:rPr lang="en" sz="900" dirty="0">
-                <a:solidFill>
-                  <a:schemeClr val="dk2"/>
-                </a:solidFill>
-                <a:latin typeface="Google Sans"/>
-                <a:ea typeface="Google Sans"/>
-                <a:cs typeface="Google Sans"/>
-                <a:sym typeface="Google Sans"/>
-              </a:rPr>
-              <a:t>Research Assistant for ML @ AUS</a:t>
-            </a:r>
-            <a:endParaRPr sz="900" dirty="0">
-              <a:solidFill>
-                <a:schemeClr val="dk2"/>
-              </a:solidFill>
-            </a:endParaRPr>
+              <a:t>Rohan Mitra &amp; Omar Gouda</a:t>
+            </a:r>
           </a:p>
         </p:txBody>
       </p:sp>
+      <p:pic>
+        <p:nvPicPr>
+          <p:cNvPr id="4" name="Picture 3">
+            <a:extLst>
+              <a:ext uri="{FF2B5EF4-FFF2-40B4-BE49-F238E27FC236}">
+                <a16:creationId xmlns:a16="http://schemas.microsoft.com/office/drawing/2014/main" id="{34A874BD-CDD2-3C4D-50DE-EB70AAB6885A}"/>
+              </a:ext>
+            </a:extLst>
+          </p:cNvPr>
+          <p:cNvPicPr>
+            <a:picLocks noChangeAspect="1"/>
+          </p:cNvPicPr>
+          <p:nvPr/>
+        </p:nvPicPr>
+        <p:blipFill>
+          <a:blip r:embed="rId4"/>
+          <a:stretch>
+            <a:fillRect/>
+          </a:stretch>
+        </p:blipFill>
+        <p:spPr>
+          <a:xfrm>
+            <a:off x="298804" y="73840"/>
+            <a:ext cx="3150978" cy="1389286"/>
+          </a:xfrm>
+          <a:prstGeom prst="rect">
+            <a:avLst/>
+          </a:prstGeom>
+        </p:spPr>
+      </p:pic>
     </p:spTree>
   </p:cSld>
   <p:clrMapOvr>
@@ -7142,10 +7091,10 @@
       </p:sp>
       <p:sp>
         <p:nvSpPr>
-          <p:cNvPr id="3" name="Rectangle 2">
+          <p:cNvPr id="18" name="Google Shape;290;p36">
             <a:extLst>
               <a:ext uri="{FF2B5EF4-FFF2-40B4-BE49-F238E27FC236}">
-                <a16:creationId xmlns:a16="http://schemas.microsoft.com/office/drawing/2014/main" id="{4CE43EFF-DFF5-F990-6DF2-4BADCB755AD1}"/>
+                <a16:creationId xmlns:a16="http://schemas.microsoft.com/office/drawing/2014/main" id="{9C8117F0-C57B-CC61-286C-219B3C5F18B5}"/>
               </a:ext>
             </a:extLst>
           </p:cNvPr>
@@ -7154,16 +7103,135 @@
         </p:nvSpPr>
         <p:spPr>
           <a:xfrm>
-            <a:off x="3129775" y="441867"/>
-            <a:ext cx="2401229" cy="468351"/>
+            <a:off x="84324" y="94917"/>
+            <a:ext cx="2153354" cy="886390"/>
+          </a:xfrm>
+          <a:prstGeom prst="roundRect">
+            <a:avLst>
+              <a:gd name="adj" fmla="val 28113"/>
+            </a:avLst>
+          </a:prstGeom>
+          <a:solidFill>
+            <a:schemeClr val="lt1"/>
+          </a:solidFill>
+          <a:ln w="19050" cap="flat" cmpd="sng">
+            <a:solidFill>
+              <a:srgbClr val="1E1E1E"/>
+            </a:solidFill>
+            <a:prstDash val="solid"/>
+            <a:round/>
+            <a:headEnd type="none" w="sm" len="sm"/>
+            <a:tailEnd type="none" w="sm" len="sm"/>
+          </a:ln>
+        </p:spPr>
+        <p:txBody>
+          <a:bodyPr spcFirstLastPara="1" wrap="square" lIns="91425" tIns="91425" rIns="91425" bIns="91425" anchor="ctr" anchorCtr="0">
+            <a:noAutofit/>
+          </a:bodyPr>
+          <a:lstStyle/>
+          <a:p>
+            <a:pPr marL="0" lvl="0" indent="0" algn="l" rtl="0">
+              <a:spcBef>
+                <a:spcPts val="0"/>
+              </a:spcBef>
+              <a:spcAft>
+                <a:spcPts val="0"/>
+              </a:spcAft>
+              <a:buClr>
+                <a:schemeClr val="dk1"/>
+              </a:buClr>
+              <a:buSzPts val="1100"/>
+              <a:buFont typeface="Arial"/>
+              <a:buNone/>
+            </a:pPr>
+            <a:r>
+              <a:rPr lang="en" sz="2500" dirty="0">
+                <a:solidFill>
+                  <a:srgbClr val="1E1E1E"/>
+                </a:solidFill>
+                <a:latin typeface="Google Sans"/>
+                <a:ea typeface="Google Sans"/>
+                <a:cs typeface="Google Sans"/>
+                <a:sym typeface="Google Sans"/>
+              </a:rPr>
+              <a:t>Document Retriever</a:t>
+            </a:r>
+            <a:endParaRPr dirty="0">
+              <a:solidFill>
+                <a:srgbClr val="1E1E1E"/>
+              </a:solidFill>
+              <a:latin typeface="Roboto Mono Light"/>
+              <a:ea typeface="Roboto Mono Light"/>
+              <a:cs typeface="Roboto Mono Light"/>
+              <a:sym typeface="Roboto Mono Light"/>
+            </a:endParaRPr>
+          </a:p>
+        </p:txBody>
+      </p:sp>
+      <p:sp>
+        <p:nvSpPr>
+          <p:cNvPr id="5" name="TextBox 4">
+            <a:extLst>
+              <a:ext uri="{FF2B5EF4-FFF2-40B4-BE49-F238E27FC236}">
+                <a16:creationId xmlns:a16="http://schemas.microsoft.com/office/drawing/2014/main" id="{D5C2E32A-70F1-C54B-36CF-3DBBC717445D}"/>
+              </a:ext>
+            </a:extLst>
+          </p:cNvPr>
+          <p:cNvSpPr txBox="1"/>
+          <p:nvPr/>
+        </p:nvSpPr>
+        <p:spPr>
+          <a:xfrm>
+            <a:off x="84324" y="1537652"/>
+            <a:ext cx="3050366" cy="738664"/>
           </a:xfrm>
           <a:prstGeom prst="rect">
             <a:avLst/>
           </a:prstGeom>
           <a:noFill/>
-          <a:ln>
-            <a:noFill/>
-          </a:ln>
+        </p:spPr>
+        <p:txBody>
+          <a:bodyPr wrap="square" rtlCol="0">
+            <a:spAutoFit/>
+          </a:bodyPr>
+          <a:lstStyle/>
+          <a:p>
+            <a:pPr algn="ctr"/>
+            <a:r>
+              <a:rPr lang="en-US" sz="1400" dirty="0"/>
+              <a:t>“How much does it cost to repair a gear and what all does it include, at Cymbal Bikes?”</a:t>
+            </a:r>
+            <a:endParaRPr lang="en-US" dirty="0"/>
+          </a:p>
+        </p:txBody>
+      </p:sp>
+      <p:sp>
+        <p:nvSpPr>
+          <p:cNvPr id="13" name="Rectangle: Rounded Corners 12">
+            <a:extLst>
+              <a:ext uri="{FF2B5EF4-FFF2-40B4-BE49-F238E27FC236}">
+                <a16:creationId xmlns:a16="http://schemas.microsoft.com/office/drawing/2014/main" id="{994A1B87-6D39-6E24-1158-9BF270DDEC67}"/>
+              </a:ext>
+            </a:extLst>
+          </p:cNvPr>
+          <p:cNvSpPr/>
+          <p:nvPr/>
+        </p:nvSpPr>
+        <p:spPr>
+          <a:xfrm>
+            <a:off x="662805" y="2717637"/>
+            <a:ext cx="1914664" cy="460918"/>
+          </a:xfrm>
+          <a:prstGeom prst="roundRect">
+            <a:avLst/>
+          </a:prstGeom>
+          <a:solidFill>
+            <a:schemeClr val="accent3">
+              <a:lumMod val="60000"/>
+              <a:lumOff val="40000"/>
+            </a:schemeClr>
+          </a:solidFill>
+          <a:ln w="12700"/>
         </p:spPr>
         <p:style>
           <a:lnRef idx="2">
@@ -7186,16 +7254,23 @@
           <a:lstStyle/>
           <a:p>
             <a:pPr algn="ctr"/>
-            <a:endParaRPr lang="en-US" dirty="0"/>
+            <a:r>
+              <a:rPr lang="en-US" dirty="0">
+                <a:solidFill>
+                  <a:schemeClr val="tx1"/>
+                </a:solidFill>
+              </a:rPr>
+              <a:t>Sentence Embedding Model</a:t>
+            </a:r>
           </a:p>
         </p:txBody>
       </p:sp>
       <p:sp>
         <p:nvSpPr>
-          <p:cNvPr id="18" name="Google Shape;290;p36">
+          <p:cNvPr id="17" name="Rectangle: Rounded Corners 16">
             <a:extLst>
               <a:ext uri="{FF2B5EF4-FFF2-40B4-BE49-F238E27FC236}">
-                <a16:creationId xmlns:a16="http://schemas.microsoft.com/office/drawing/2014/main" id="{9C8117F0-C57B-CC61-286C-219B3C5F18B5}"/>
+                <a16:creationId xmlns:a16="http://schemas.microsoft.com/office/drawing/2014/main" id="{FD6DFCD9-D033-D822-FA10-4F15D120377B}"/>
               </a:ext>
             </a:extLst>
           </p:cNvPr>
@@ -7204,123 +7279,8 @@
         </p:nvSpPr>
         <p:spPr>
           <a:xfrm>
-            <a:off x="84324" y="94917"/>
-            <a:ext cx="2153354" cy="886390"/>
-          </a:xfrm>
-          <a:prstGeom prst="roundRect">
-            <a:avLst>
-              <a:gd name="adj" fmla="val 28113"/>
-            </a:avLst>
-          </a:prstGeom>
-          <a:solidFill>
-            <a:schemeClr val="lt1"/>
-          </a:solidFill>
-          <a:ln w="19050" cap="flat" cmpd="sng">
-            <a:solidFill>
-              <a:srgbClr val="1E1E1E"/>
-            </a:solidFill>
-            <a:prstDash val="solid"/>
-            <a:round/>
-            <a:headEnd type="none" w="sm" len="sm"/>
-            <a:tailEnd type="none" w="sm" len="sm"/>
-          </a:ln>
-        </p:spPr>
-        <p:txBody>
-          <a:bodyPr spcFirstLastPara="1" wrap="square" lIns="91425" tIns="91425" rIns="91425" bIns="91425" anchor="ctr" anchorCtr="0">
-            <a:noAutofit/>
-          </a:bodyPr>
-          <a:lstStyle/>
-          <a:p>
-            <a:pPr marL="0" lvl="0" indent="0" algn="l" rtl="0">
-              <a:spcBef>
-                <a:spcPts val="0"/>
-              </a:spcBef>
-              <a:spcAft>
-                <a:spcPts val="0"/>
-              </a:spcAft>
-              <a:buClr>
-                <a:schemeClr val="dk1"/>
-              </a:buClr>
-              <a:buSzPts val="1100"/>
-              <a:buFont typeface="Arial"/>
-              <a:buNone/>
-            </a:pPr>
-            <a:r>
-              <a:rPr lang="en" sz="2500" dirty="0">
-                <a:solidFill>
-                  <a:srgbClr val="1E1E1E"/>
-                </a:solidFill>
-                <a:latin typeface="Google Sans"/>
-                <a:ea typeface="Google Sans"/>
-                <a:cs typeface="Google Sans"/>
-                <a:sym typeface="Google Sans"/>
-              </a:rPr>
-              <a:t>Document Fetcher</a:t>
-            </a:r>
-            <a:endParaRPr dirty="0">
-              <a:solidFill>
-                <a:srgbClr val="1E1E1E"/>
-              </a:solidFill>
-              <a:latin typeface="Roboto Mono Light"/>
-              <a:ea typeface="Roboto Mono Light"/>
-              <a:cs typeface="Roboto Mono Light"/>
-              <a:sym typeface="Roboto Mono Light"/>
-            </a:endParaRPr>
-          </a:p>
-        </p:txBody>
-      </p:sp>
-      <p:sp>
-        <p:nvSpPr>
-          <p:cNvPr id="5" name="TextBox 4">
-            <a:extLst>
-              <a:ext uri="{FF2B5EF4-FFF2-40B4-BE49-F238E27FC236}">
-                <a16:creationId xmlns:a16="http://schemas.microsoft.com/office/drawing/2014/main" id="{D5C2E32A-70F1-C54B-36CF-3DBBC717445D}"/>
-              </a:ext>
-            </a:extLst>
-          </p:cNvPr>
-          <p:cNvSpPr txBox="1"/>
-          <p:nvPr/>
-        </p:nvSpPr>
-        <p:spPr>
-          <a:xfrm>
-            <a:off x="2810107" y="276502"/>
-            <a:ext cx="4177991" cy="523220"/>
-          </a:xfrm>
-          <a:prstGeom prst="rect">
-            <a:avLst/>
-          </a:prstGeom>
-          <a:noFill/>
-        </p:spPr>
-        <p:txBody>
-          <a:bodyPr wrap="square" rtlCol="0">
-            <a:spAutoFit/>
-          </a:bodyPr>
-          <a:lstStyle/>
-          <a:p>
-            <a:r>
-              <a:rPr lang="en-US" sz="1400" dirty="0"/>
-              <a:t>“I want a smart TV 70-inch Samsung with Android OS. Show me cheapest options”</a:t>
-            </a:r>
-            <a:endParaRPr lang="en-US" dirty="0"/>
-          </a:p>
-        </p:txBody>
-      </p:sp>
-      <p:sp>
-        <p:nvSpPr>
-          <p:cNvPr id="7" name="Rectangle: Rounded Corners 6">
-            <a:extLst>
-              <a:ext uri="{FF2B5EF4-FFF2-40B4-BE49-F238E27FC236}">
-                <a16:creationId xmlns:a16="http://schemas.microsoft.com/office/drawing/2014/main" id="{3BEC1949-43EC-E475-8AC0-0FF1A1B643FA}"/>
-              </a:ext>
-            </a:extLst>
-          </p:cNvPr>
-          <p:cNvSpPr/>
-          <p:nvPr/>
-        </p:nvSpPr>
-        <p:spPr>
-          <a:xfrm>
-            <a:off x="594732" y="1590907"/>
-            <a:ext cx="1642946" cy="460918"/>
+            <a:off x="5831479" y="233714"/>
+            <a:ext cx="2401228" cy="747593"/>
           </a:xfrm>
           <a:prstGeom prst="roundRect">
             <a:avLst/>
@@ -7360,17 +7320,17 @@
                   <a:schemeClr val="tx1"/>
                 </a:solidFill>
               </a:rPr>
-              <a:t>TVs index</a:t>
+              <a:t>Index with Chunked Documents</a:t>
             </a:r>
           </a:p>
         </p:txBody>
       </p:sp>
       <p:sp>
         <p:nvSpPr>
-          <p:cNvPr id="11" name="Rectangle: Rounded Corners 10">
+          <p:cNvPr id="24" name="Rectangle: Rounded Corners 23">
             <a:extLst>
               <a:ext uri="{FF2B5EF4-FFF2-40B4-BE49-F238E27FC236}">
-                <a16:creationId xmlns:a16="http://schemas.microsoft.com/office/drawing/2014/main" id="{5E035E4E-B9AF-2862-E8D5-693D32B3E547}"/>
+                <a16:creationId xmlns:a16="http://schemas.microsoft.com/office/drawing/2014/main" id="{089E31E3-1BA2-4CA3-13EB-99088131B6C6}"/>
               </a:ext>
             </a:extLst>
           </p:cNvPr>
@@ -7379,8 +7339,8 @@
         </p:nvSpPr>
         <p:spPr>
           <a:xfrm>
-            <a:off x="594732" y="2217115"/>
-            <a:ext cx="1642946" cy="2462212"/>
+            <a:off x="5664277" y="1311645"/>
+            <a:ext cx="2735632" cy="297895"/>
           </a:xfrm>
           <a:prstGeom prst="roundRect">
             <a:avLst/>
@@ -7414,134 +7374,23 @@
           <a:lstStyle/>
           <a:p>
             <a:pPr algn="ctr"/>
-            <a:endParaRPr lang="en-US" dirty="0">
-              <a:solidFill>
-                <a:schemeClr val="tx1"/>
-              </a:solidFill>
-            </a:endParaRPr>
+            <a:r>
+              <a:rPr lang="en-US" dirty="0">
+                <a:solidFill>
+                  <a:schemeClr val="tx1"/>
+                </a:solidFill>
+              </a:rPr>
+              <a:t>Document 1 Embedding Vector</a:t>
+            </a:r>
           </a:p>
         </p:txBody>
       </p:sp>
       <p:sp>
         <p:nvSpPr>
-          <p:cNvPr id="12" name="TextBox 11">
+          <p:cNvPr id="2" name="Rectangle: Rounded Corners 1">
             <a:extLst>
               <a:ext uri="{FF2B5EF4-FFF2-40B4-BE49-F238E27FC236}">
-                <a16:creationId xmlns:a16="http://schemas.microsoft.com/office/drawing/2014/main" id="{D6EC5E73-7FA9-FCAE-291D-BAEF2D1F8F3A}"/>
-              </a:ext>
-            </a:extLst>
-          </p:cNvPr>
-          <p:cNvSpPr txBox="1"/>
-          <p:nvPr/>
-        </p:nvSpPr>
-        <p:spPr>
-          <a:xfrm>
-            <a:off x="594732" y="2365798"/>
-            <a:ext cx="1598341" cy="2462213"/>
-          </a:xfrm>
-          <a:prstGeom prst="rect">
-            <a:avLst/>
-          </a:prstGeom>
-          <a:noFill/>
-        </p:spPr>
-        <p:txBody>
-          <a:bodyPr wrap="square" rtlCol="0">
-            <a:spAutoFit/>
-          </a:bodyPr>
-          <a:lstStyle/>
-          <a:p>
-            <a:r>
-              <a:rPr lang="en-US" u="sng" dirty="0">
-                <a:solidFill>
-                  <a:schemeClr val="tx1"/>
-                </a:solidFill>
-              </a:rPr>
-              <a:t>Filters Applied:</a:t>
-            </a:r>
-          </a:p>
-          <a:p>
-            <a:r>
-              <a:rPr lang="en-US" dirty="0">
-                <a:solidFill>
-                  <a:schemeClr val="tx1"/>
-                </a:solidFill>
-              </a:rPr>
-              <a:t>Brand=Samsung</a:t>
-            </a:r>
-          </a:p>
-          <a:p>
-            <a:r>
-              <a:rPr lang="en-US" dirty="0">
-                <a:solidFill>
-                  <a:schemeClr val="tx1"/>
-                </a:solidFill>
-              </a:rPr>
-              <a:t>Size = 70</a:t>
-            </a:r>
-          </a:p>
-          <a:p>
-            <a:r>
-              <a:rPr lang="en-US" dirty="0">
-                <a:solidFill>
-                  <a:schemeClr val="tx1"/>
-                </a:solidFill>
-              </a:rPr>
-              <a:t>Sort = price ASC</a:t>
-            </a:r>
-          </a:p>
-          <a:p>
-            <a:endParaRPr lang="en-US" dirty="0">
-              <a:solidFill>
-                <a:schemeClr val="tx1"/>
-              </a:solidFill>
-            </a:endParaRPr>
-          </a:p>
-          <a:p>
-            <a:r>
-              <a:rPr lang="en-US" dirty="0">
-                <a:solidFill>
-                  <a:schemeClr val="tx1"/>
-                </a:solidFill>
-              </a:rPr>
-              <a:t>Vector Similarity Search: ON</a:t>
-            </a:r>
-          </a:p>
-          <a:p>
-            <a:endParaRPr lang="en-US" dirty="0">
-              <a:solidFill>
-                <a:schemeClr val="tx1"/>
-              </a:solidFill>
-            </a:endParaRPr>
-          </a:p>
-          <a:p>
-            <a:r>
-              <a:rPr lang="en-US" dirty="0">
-                <a:solidFill>
-                  <a:schemeClr val="tx1"/>
-                </a:solidFill>
-              </a:rPr>
-              <a:t>Documents Fetched: 5</a:t>
-            </a:r>
-          </a:p>
-          <a:p>
-            <a:pPr marL="285750" indent="-285750">
-              <a:buFontTx/>
-              <a:buChar char="-"/>
-            </a:pPr>
-            <a:endParaRPr lang="en-US" dirty="0">
-              <a:solidFill>
-                <a:schemeClr val="tx1"/>
-              </a:solidFill>
-            </a:endParaRPr>
-          </a:p>
-        </p:txBody>
-      </p:sp>
-      <p:sp>
-        <p:nvSpPr>
-          <p:cNvPr id="13" name="Rectangle: Rounded Corners 12">
-            <a:extLst>
-              <a:ext uri="{FF2B5EF4-FFF2-40B4-BE49-F238E27FC236}">
-                <a16:creationId xmlns:a16="http://schemas.microsoft.com/office/drawing/2014/main" id="{994A1B87-6D39-6E24-1158-9BF270DDEC67}"/>
+                <a16:creationId xmlns:a16="http://schemas.microsoft.com/office/drawing/2014/main" id="{FC0A0C51-7C43-E53C-EE31-AC50ADB5C703}"/>
               </a:ext>
             </a:extLst>
           </p:cNvPr>
@@ -7550,8 +7399,8 @@
         </p:nvSpPr>
         <p:spPr>
           <a:xfrm>
-            <a:off x="2568498" y="1590907"/>
-            <a:ext cx="1642946" cy="460918"/>
+            <a:off x="320695" y="3574192"/>
+            <a:ext cx="2615127" cy="297737"/>
           </a:xfrm>
           <a:prstGeom prst="roundRect">
             <a:avLst/>
@@ -7591,17 +7440,17 @@
                   <a:schemeClr val="tx1"/>
                 </a:solidFill>
               </a:rPr>
-              <a:t>TVs index</a:t>
+              <a:t>Question Embedding Vector</a:t>
             </a:r>
           </a:p>
         </p:txBody>
       </p:sp>
       <p:sp>
         <p:nvSpPr>
-          <p:cNvPr id="15" name="Rectangle: Rounded Corners 14">
+          <p:cNvPr id="4" name="Rectangle: Rounded Corners 3">
             <a:extLst>
               <a:ext uri="{FF2B5EF4-FFF2-40B4-BE49-F238E27FC236}">
-                <a16:creationId xmlns:a16="http://schemas.microsoft.com/office/drawing/2014/main" id="{9C65B8FF-8024-BF92-25CC-93BFCBF9CD42}"/>
+                <a16:creationId xmlns:a16="http://schemas.microsoft.com/office/drawing/2014/main" id="{FEED123D-13F6-1648-FC54-C35560756DB1}"/>
               </a:ext>
             </a:extLst>
           </p:cNvPr>
@@ -7610,8 +7459,8 @@
         </p:nvSpPr>
         <p:spPr>
           <a:xfrm>
-            <a:off x="4542264" y="1590907"/>
-            <a:ext cx="1642946" cy="460918"/>
+            <a:off x="5664277" y="1891808"/>
+            <a:ext cx="2735632" cy="297895"/>
           </a:xfrm>
           <a:prstGeom prst="roundRect">
             <a:avLst/>
@@ -7651,17 +7500,17 @@
                   <a:schemeClr val="tx1"/>
                 </a:solidFill>
               </a:rPr>
-              <a:t>TVs index</a:t>
+              <a:t>Document 2 Embedding Vector</a:t>
             </a:r>
           </a:p>
         </p:txBody>
       </p:sp>
       <p:sp>
         <p:nvSpPr>
-          <p:cNvPr id="17" name="Rectangle: Rounded Corners 16">
+          <p:cNvPr id="8" name="Rectangle: Rounded Corners 7">
             <a:extLst>
               <a:ext uri="{FF2B5EF4-FFF2-40B4-BE49-F238E27FC236}">
-                <a16:creationId xmlns:a16="http://schemas.microsoft.com/office/drawing/2014/main" id="{FD6DFCD9-D033-D822-FA10-4F15D120377B}"/>
+                <a16:creationId xmlns:a16="http://schemas.microsoft.com/office/drawing/2014/main" id="{6A03DBF0-F629-6C89-7BAC-E9D5DB35113A}"/>
               </a:ext>
             </a:extLst>
           </p:cNvPr>
@@ -7670,8 +7519,8 @@
         </p:nvSpPr>
         <p:spPr>
           <a:xfrm>
-            <a:off x="6582936" y="1590907"/>
-            <a:ext cx="1642946" cy="460918"/>
+            <a:off x="5664277" y="2471971"/>
+            <a:ext cx="2735632" cy="297895"/>
           </a:xfrm>
           <a:prstGeom prst="roundRect">
             <a:avLst/>
@@ -7706,30 +7555,22 @@
           <a:p>
             <a:pPr algn="ctr"/>
             <a:r>
-              <a:rPr lang="en-US" dirty="0" err="1">
+              <a:rPr lang="en-US" dirty="0">
                 <a:solidFill>
                   <a:schemeClr val="tx1"/>
                 </a:solidFill>
               </a:rPr>
-              <a:t>Latest_products</a:t>
-            </a:r>
-            <a:r>
-              <a:rPr lang="en-US" dirty="0">
-                <a:solidFill>
-                  <a:schemeClr val="tx1"/>
-                </a:solidFill>
-              </a:rPr>
-              <a:t> index</a:t>
+              <a:t>Document 3 Embedding Vector</a:t>
             </a:r>
           </a:p>
         </p:txBody>
       </p:sp>
       <p:sp>
         <p:nvSpPr>
-          <p:cNvPr id="19" name="Rectangle: Rounded Corners 18">
+          <p:cNvPr id="9" name="Rectangle: Rounded Corners 8">
             <a:extLst>
               <a:ext uri="{FF2B5EF4-FFF2-40B4-BE49-F238E27FC236}">
-                <a16:creationId xmlns:a16="http://schemas.microsoft.com/office/drawing/2014/main" id="{AB37C8F0-B0CC-B16B-9C0C-F5F6F9797159}"/>
+                <a16:creationId xmlns:a16="http://schemas.microsoft.com/office/drawing/2014/main" id="{BD316B41-7DCC-BE55-B783-878BD790FEF5}"/>
               </a:ext>
             </a:extLst>
           </p:cNvPr>
@@ -7738,8 +7579,8 @@
         </p:nvSpPr>
         <p:spPr>
           <a:xfrm>
-            <a:off x="4542264" y="2217115"/>
-            <a:ext cx="1642946" cy="2462212"/>
+            <a:off x="5664277" y="4196449"/>
+            <a:ext cx="2735632" cy="297895"/>
           </a:xfrm>
           <a:prstGeom prst="roundRect">
             <a:avLst/>
@@ -7773,478 +7614,38 @@
           <a:lstStyle/>
           <a:p>
             <a:pPr algn="ctr"/>
-            <a:endParaRPr lang="en-US" dirty="0">
-              <a:solidFill>
-                <a:schemeClr val="tx1"/>
-              </a:solidFill>
-            </a:endParaRPr>
-          </a:p>
-        </p:txBody>
-      </p:sp>
-      <p:sp>
-        <p:nvSpPr>
-          <p:cNvPr id="21" name="TextBox 20">
-            <a:extLst>
-              <a:ext uri="{FF2B5EF4-FFF2-40B4-BE49-F238E27FC236}">
-                <a16:creationId xmlns:a16="http://schemas.microsoft.com/office/drawing/2014/main" id="{C59E789C-4F31-A1D5-7277-A812834B2910}"/>
-              </a:ext>
-            </a:extLst>
-          </p:cNvPr>
-          <p:cNvSpPr txBox="1"/>
-          <p:nvPr/>
-        </p:nvSpPr>
-        <p:spPr>
-          <a:xfrm>
-            <a:off x="4542264" y="2365798"/>
-            <a:ext cx="1598341" cy="2462213"/>
-          </a:xfrm>
-          <a:prstGeom prst="rect">
-            <a:avLst/>
-          </a:prstGeom>
-          <a:noFill/>
-        </p:spPr>
-        <p:txBody>
-          <a:bodyPr wrap="square" rtlCol="0">
-            <a:spAutoFit/>
-          </a:bodyPr>
-          <a:lstStyle/>
-          <a:p>
-            <a:r>
-              <a:rPr lang="en-US" u="sng" dirty="0">
+            <a:r>
+              <a:rPr lang="en-US" dirty="0">
                 <a:solidFill>
                   <a:schemeClr val="tx1"/>
                 </a:solidFill>
               </a:rPr>
-              <a:t>Filters Applied:</a:t>
-            </a:r>
-          </a:p>
-          <a:p>
-            <a:r>
-              <a:rPr lang="en-US" dirty="0">
-                <a:solidFill>
-                  <a:schemeClr val="tx1"/>
-                </a:solidFill>
-              </a:rPr>
-              <a:t>Size = 70</a:t>
-            </a:r>
-          </a:p>
-          <a:p>
-            <a:endParaRPr lang="en-US" dirty="0">
-              <a:solidFill>
-                <a:schemeClr val="tx1"/>
-              </a:solidFill>
-            </a:endParaRPr>
-          </a:p>
-          <a:p>
-            <a:endParaRPr lang="en-US" dirty="0">
-              <a:solidFill>
-                <a:schemeClr val="tx1"/>
-              </a:solidFill>
-            </a:endParaRPr>
-          </a:p>
-          <a:p>
-            <a:endParaRPr lang="en-US" dirty="0">
-              <a:solidFill>
-                <a:schemeClr val="tx1"/>
-              </a:solidFill>
-            </a:endParaRPr>
-          </a:p>
-          <a:p>
-            <a:r>
-              <a:rPr lang="en-US" dirty="0">
-                <a:solidFill>
-                  <a:schemeClr val="tx1"/>
-                </a:solidFill>
-              </a:rPr>
-              <a:t>Vector Similarity Search: ON</a:t>
-            </a:r>
-          </a:p>
-          <a:p>
-            <a:endParaRPr lang="en-US" dirty="0">
-              <a:solidFill>
-                <a:schemeClr val="tx1"/>
-              </a:solidFill>
-            </a:endParaRPr>
-          </a:p>
-          <a:p>
-            <a:r>
-              <a:rPr lang="en-US" dirty="0">
-                <a:solidFill>
-                  <a:schemeClr val="tx1"/>
-                </a:solidFill>
-              </a:rPr>
-              <a:t>Documents Fetched: 1</a:t>
-            </a:r>
-          </a:p>
-          <a:p>
-            <a:endParaRPr lang="en-US" dirty="0">
-              <a:solidFill>
-                <a:schemeClr val="tx1"/>
-              </a:solidFill>
-            </a:endParaRPr>
-          </a:p>
-        </p:txBody>
-      </p:sp>
-      <p:sp>
-        <p:nvSpPr>
-          <p:cNvPr id="22" name="Rectangle: Rounded Corners 21">
-            <a:extLst>
-              <a:ext uri="{FF2B5EF4-FFF2-40B4-BE49-F238E27FC236}">
-                <a16:creationId xmlns:a16="http://schemas.microsoft.com/office/drawing/2014/main" id="{B60D1B30-1EBB-15A6-F95E-807E61CF173E}"/>
-              </a:ext>
-            </a:extLst>
-          </p:cNvPr>
-          <p:cNvSpPr/>
-          <p:nvPr/>
-        </p:nvSpPr>
-        <p:spPr>
-          <a:xfrm>
-            <a:off x="2568498" y="2217115"/>
-            <a:ext cx="1642946" cy="2462212"/>
-          </a:xfrm>
-          <a:prstGeom prst="roundRect">
-            <a:avLst/>
-          </a:prstGeom>
-          <a:solidFill>
-            <a:schemeClr val="accent3">
-              <a:lumMod val="60000"/>
-              <a:lumOff val="40000"/>
-            </a:schemeClr>
-          </a:solidFill>
-          <a:ln w="12700"/>
-        </p:spPr>
-        <p:style>
-          <a:lnRef idx="2">
-            <a:schemeClr val="accent1">
-              <a:shade val="15000"/>
-            </a:schemeClr>
-          </a:lnRef>
-          <a:fillRef idx="1">
-            <a:schemeClr val="accent1"/>
-          </a:fillRef>
-          <a:effectRef idx="0">
-            <a:schemeClr val="accent1"/>
-          </a:effectRef>
-          <a:fontRef idx="minor">
-            <a:schemeClr val="lt1"/>
-          </a:fontRef>
-        </p:style>
-        <p:txBody>
-          <a:bodyPr rtlCol="0" anchor="ctr"/>
-          <a:lstStyle/>
-          <a:p>
-            <a:pPr algn="ctr"/>
-            <a:endParaRPr lang="en-US" dirty="0">
-              <a:solidFill>
-                <a:schemeClr val="tx1"/>
-              </a:solidFill>
-            </a:endParaRPr>
-          </a:p>
-        </p:txBody>
-      </p:sp>
-      <p:sp>
-        <p:nvSpPr>
-          <p:cNvPr id="23" name="TextBox 22">
-            <a:extLst>
-              <a:ext uri="{FF2B5EF4-FFF2-40B4-BE49-F238E27FC236}">
-                <a16:creationId xmlns:a16="http://schemas.microsoft.com/office/drawing/2014/main" id="{350E5576-A631-94F5-89D5-512C77C33532}"/>
-              </a:ext>
-            </a:extLst>
-          </p:cNvPr>
-          <p:cNvSpPr txBox="1"/>
-          <p:nvPr/>
-        </p:nvSpPr>
-        <p:spPr>
-          <a:xfrm>
-            <a:off x="2568498" y="2365798"/>
-            <a:ext cx="1598341" cy="2462213"/>
-          </a:xfrm>
-          <a:prstGeom prst="rect">
-            <a:avLst/>
-          </a:prstGeom>
-          <a:noFill/>
-        </p:spPr>
-        <p:txBody>
-          <a:bodyPr wrap="square" rtlCol="0">
-            <a:spAutoFit/>
-          </a:bodyPr>
-          <a:lstStyle/>
-          <a:p>
-            <a:r>
-              <a:rPr lang="en-US" u="sng" dirty="0">
-                <a:solidFill>
-                  <a:schemeClr val="tx1"/>
-                </a:solidFill>
-              </a:rPr>
-              <a:t>Filters Applied:</a:t>
-            </a:r>
-          </a:p>
-          <a:p>
-            <a:r>
-              <a:rPr lang="en-US" dirty="0">
-                <a:solidFill>
-                  <a:schemeClr val="tx1"/>
-                </a:solidFill>
-              </a:rPr>
-              <a:t>Brand=Samsung</a:t>
-            </a:r>
-          </a:p>
-          <a:p>
-            <a:r>
-              <a:rPr lang="en-US" dirty="0">
-                <a:solidFill>
-                  <a:schemeClr val="tx1"/>
-                </a:solidFill>
-              </a:rPr>
-              <a:t>Size = 70</a:t>
-            </a:r>
-          </a:p>
-          <a:p>
-            <a:r>
-              <a:rPr lang="en-US" dirty="0">
-                <a:solidFill>
-                  <a:schemeClr val="tx1"/>
-                </a:solidFill>
-              </a:rPr>
-              <a:t>Sort = price ASC</a:t>
-            </a:r>
-          </a:p>
-          <a:p>
-            <a:endParaRPr lang="en-US" dirty="0">
-              <a:solidFill>
-                <a:schemeClr val="tx1"/>
-              </a:solidFill>
-            </a:endParaRPr>
-          </a:p>
-          <a:p>
-            <a:r>
-              <a:rPr lang="en-US" dirty="0">
-                <a:solidFill>
-                  <a:schemeClr val="tx1"/>
-                </a:solidFill>
-              </a:rPr>
-              <a:t>Vector Similarity Search: OFF</a:t>
-            </a:r>
-          </a:p>
-          <a:p>
-            <a:endParaRPr lang="en-US" dirty="0">
-              <a:solidFill>
-                <a:schemeClr val="tx1"/>
-              </a:solidFill>
-            </a:endParaRPr>
-          </a:p>
-          <a:p>
-            <a:r>
-              <a:rPr lang="en-US" dirty="0">
-                <a:solidFill>
-                  <a:schemeClr val="tx1"/>
-                </a:solidFill>
-              </a:rPr>
-              <a:t>Documents Fetched: 2</a:t>
-            </a:r>
-          </a:p>
-          <a:p>
-            <a:pPr marL="285750" indent="-285750">
-              <a:buFontTx/>
-              <a:buChar char="-"/>
-            </a:pPr>
-            <a:endParaRPr lang="en-US" dirty="0">
-              <a:solidFill>
-                <a:schemeClr val="tx1"/>
-              </a:solidFill>
-            </a:endParaRPr>
-          </a:p>
-        </p:txBody>
-      </p:sp>
-      <p:sp>
-        <p:nvSpPr>
-          <p:cNvPr id="24" name="Rectangle: Rounded Corners 23">
-            <a:extLst>
-              <a:ext uri="{FF2B5EF4-FFF2-40B4-BE49-F238E27FC236}">
-                <a16:creationId xmlns:a16="http://schemas.microsoft.com/office/drawing/2014/main" id="{089E31E3-1BA2-4CA3-13EB-99088131B6C6}"/>
-              </a:ext>
-            </a:extLst>
-          </p:cNvPr>
-          <p:cNvSpPr/>
-          <p:nvPr/>
-        </p:nvSpPr>
-        <p:spPr>
-          <a:xfrm>
-            <a:off x="6582936" y="2217115"/>
-            <a:ext cx="1642946" cy="2462212"/>
-          </a:xfrm>
-          <a:prstGeom prst="roundRect">
-            <a:avLst/>
-          </a:prstGeom>
-          <a:solidFill>
-            <a:schemeClr val="accent3">
-              <a:lumMod val="60000"/>
-              <a:lumOff val="40000"/>
-            </a:schemeClr>
-          </a:solidFill>
-          <a:ln w="12700"/>
-        </p:spPr>
-        <p:style>
-          <a:lnRef idx="2">
-            <a:schemeClr val="accent1">
-              <a:shade val="15000"/>
-            </a:schemeClr>
-          </a:lnRef>
-          <a:fillRef idx="1">
-            <a:schemeClr val="accent1"/>
-          </a:fillRef>
-          <a:effectRef idx="0">
-            <a:schemeClr val="accent1"/>
-          </a:effectRef>
-          <a:fontRef idx="minor">
-            <a:schemeClr val="lt1"/>
-          </a:fontRef>
-        </p:style>
-        <p:txBody>
-          <a:bodyPr rtlCol="0" anchor="ctr"/>
-          <a:lstStyle/>
-          <a:p>
-            <a:pPr algn="ctr"/>
-            <a:endParaRPr lang="en-US" dirty="0">
-              <a:solidFill>
-                <a:schemeClr val="tx1"/>
-              </a:solidFill>
-            </a:endParaRPr>
-          </a:p>
-        </p:txBody>
-      </p:sp>
-      <p:sp>
-        <p:nvSpPr>
-          <p:cNvPr id="25" name="TextBox 24">
-            <a:extLst>
-              <a:ext uri="{FF2B5EF4-FFF2-40B4-BE49-F238E27FC236}">
-                <a16:creationId xmlns:a16="http://schemas.microsoft.com/office/drawing/2014/main" id="{7E2214B2-75B6-C4DC-C032-96BD853DE680}"/>
-              </a:ext>
-            </a:extLst>
-          </p:cNvPr>
-          <p:cNvSpPr txBox="1"/>
-          <p:nvPr/>
-        </p:nvSpPr>
-        <p:spPr>
-          <a:xfrm>
-            <a:off x="6582936" y="2365798"/>
-            <a:ext cx="1598341" cy="2462213"/>
-          </a:xfrm>
-          <a:prstGeom prst="rect">
-            <a:avLst/>
-          </a:prstGeom>
-          <a:noFill/>
-        </p:spPr>
-        <p:txBody>
-          <a:bodyPr wrap="square" rtlCol="0">
-            <a:spAutoFit/>
-          </a:bodyPr>
-          <a:lstStyle/>
-          <a:p>
-            <a:r>
-              <a:rPr lang="en-US" u="sng" dirty="0">
-                <a:solidFill>
-                  <a:schemeClr val="tx1"/>
-                </a:solidFill>
-              </a:rPr>
-              <a:t>Filters Applied:</a:t>
-            </a:r>
-          </a:p>
-          <a:p>
-            <a:r>
-              <a:rPr lang="en-US" dirty="0">
-                <a:solidFill>
-                  <a:schemeClr val="tx1"/>
-                </a:solidFill>
-              </a:rPr>
-              <a:t>Brand=Samsung</a:t>
-            </a:r>
-          </a:p>
-          <a:p>
-            <a:r>
-              <a:rPr lang="en-US" dirty="0">
-                <a:solidFill>
-                  <a:schemeClr val="tx1"/>
-                </a:solidFill>
-              </a:rPr>
-              <a:t>Vertical = TV</a:t>
-            </a:r>
-          </a:p>
-          <a:p>
-            <a:endParaRPr lang="en-US" dirty="0">
-              <a:solidFill>
-                <a:schemeClr val="tx1"/>
-              </a:solidFill>
-            </a:endParaRPr>
-          </a:p>
-          <a:p>
-            <a:r>
-              <a:rPr lang="en-US" dirty="0">
-                <a:solidFill>
-                  <a:schemeClr val="tx1"/>
-                </a:solidFill>
-              </a:rPr>
-              <a:t>Vector Similarity Search: ON</a:t>
-            </a:r>
-          </a:p>
-          <a:p>
-            <a:endParaRPr lang="en-US" dirty="0">
-              <a:solidFill>
-                <a:schemeClr val="tx1"/>
-              </a:solidFill>
-            </a:endParaRPr>
-          </a:p>
-          <a:p>
-            <a:r>
-              <a:rPr lang="en-US" dirty="0">
-                <a:solidFill>
-                  <a:schemeClr val="tx1"/>
-                </a:solidFill>
-              </a:rPr>
-              <a:t>Documents Fetched: 2</a:t>
-            </a:r>
-          </a:p>
-          <a:p>
-            <a:endParaRPr lang="en-US" dirty="0">
-              <a:solidFill>
-                <a:schemeClr val="tx1"/>
-              </a:solidFill>
-            </a:endParaRPr>
-          </a:p>
-          <a:p>
-            <a:pPr marL="285750" indent="-285750">
-              <a:buFontTx/>
-              <a:buChar char="-"/>
-            </a:pPr>
-            <a:endParaRPr lang="en-US" dirty="0">
-              <a:solidFill>
-                <a:schemeClr val="tx1"/>
-              </a:solidFill>
-            </a:endParaRPr>
+              <a:t>Document n Embedding Vector</a:t>
+            </a:r>
           </a:p>
         </p:txBody>
       </p:sp>
       <p:cxnSp>
         <p:nvCxnSpPr>
-          <p:cNvPr id="28" name="Connector: Elbow 27">
+          <p:cNvPr id="14" name="Straight Arrow Connector 13">
             <a:extLst>
               <a:ext uri="{FF2B5EF4-FFF2-40B4-BE49-F238E27FC236}">
-                <a16:creationId xmlns:a16="http://schemas.microsoft.com/office/drawing/2014/main" id="{D5043AF3-F5B0-C8A4-ECFC-9CCD18719C7A}"/>
+                <a16:creationId xmlns:a16="http://schemas.microsoft.com/office/drawing/2014/main" id="{6E12EA64-C18E-58C4-90C2-DD531E4501CE}"/>
               </a:ext>
             </a:extLst>
           </p:cNvPr>
           <p:cNvCxnSpPr>
             <a:stCxn id="5" idx="2"/>
-            <a:endCxn id="7" idx="0"/>
+            <a:endCxn id="13" idx="0"/>
           </p:cNvCxnSpPr>
           <p:nvPr/>
         </p:nvCxnSpPr>
         <p:spPr>
-          <a:xfrm rot="5400000">
-            <a:off x="2762062" y="-546135"/>
-            <a:ext cx="791185" cy="3482898"/>
-          </a:xfrm>
-          <a:prstGeom prst="bentConnector3">
+          <a:xfrm>
+            <a:off x="1609507" y="2276316"/>
+            <a:ext cx="10630" cy="441321"/>
+          </a:xfrm>
+          <a:prstGeom prst="straightConnector1">
             <a:avLst/>
           </a:prstGeom>
           <a:ln>
@@ -8268,29 +7669,26 @@
       </p:cxnSp>
       <p:cxnSp>
         <p:nvCxnSpPr>
-          <p:cNvPr id="29" name="Connector: Elbow 28">
+          <p:cNvPr id="20" name="Straight Arrow Connector 19">
             <a:extLst>
               <a:ext uri="{FF2B5EF4-FFF2-40B4-BE49-F238E27FC236}">
-                <a16:creationId xmlns:a16="http://schemas.microsoft.com/office/drawing/2014/main" id="{869B77F2-E3A1-2B4C-F1AA-43AC8F680B9D}"/>
+                <a16:creationId xmlns:a16="http://schemas.microsoft.com/office/drawing/2014/main" id="{D67D5A63-4C68-D3B6-2207-318F9AE27EE6}"/>
               </a:ext>
             </a:extLst>
           </p:cNvPr>
           <p:cNvCxnSpPr>
-            <a:cxnSpLocks/>
-            <a:stCxn id="5" idx="2"/>
-            <a:endCxn id="17" idx="0"/>
+            <a:stCxn id="13" idx="2"/>
+            <a:endCxn id="2" idx="0"/>
           </p:cNvCxnSpPr>
           <p:nvPr/>
         </p:nvCxnSpPr>
         <p:spPr>
-          <a:xfrm rot="16200000" flipH="1">
-            <a:off x="5756164" y="-57339"/>
-            <a:ext cx="791185" cy="2505306"/>
-          </a:xfrm>
-          <a:prstGeom prst="bentConnector3">
-            <a:avLst>
-              <a:gd name="adj1" fmla="val 50000"/>
-            </a:avLst>
+          <a:xfrm>
+            <a:off x="1620137" y="3178555"/>
+            <a:ext cx="8122" cy="395637"/>
+          </a:xfrm>
+          <a:prstGeom prst="straightConnector1">
+            <a:avLst/>
           </a:prstGeom>
           <a:ln>
             <a:tailEnd type="triangle"/>
@@ -8313,31 +7711,30 @@
       </p:cxnSp>
       <p:cxnSp>
         <p:nvCxnSpPr>
-          <p:cNvPr id="33" name="Connector: Elbow 32">
+          <p:cNvPr id="32" name="Connector: Elbow 31">
             <a:extLst>
               <a:ext uri="{FF2B5EF4-FFF2-40B4-BE49-F238E27FC236}">
-                <a16:creationId xmlns:a16="http://schemas.microsoft.com/office/drawing/2014/main" id="{6E727A88-7B97-F9F3-DF37-AFA0D37955EA}"/>
+                <a16:creationId xmlns:a16="http://schemas.microsoft.com/office/drawing/2014/main" id="{B3ABF750-0810-09F8-E2BA-02C4B223963A}"/>
               </a:ext>
             </a:extLst>
           </p:cNvPr>
           <p:cNvCxnSpPr>
-            <a:cxnSpLocks/>
-            <a:stCxn id="5" idx="2"/>
-            <a:endCxn id="15" idx="0"/>
+            <a:stCxn id="2" idx="3"/>
+            <a:endCxn id="24" idx="1"/>
           </p:cNvCxnSpPr>
           <p:nvPr/>
         </p:nvCxnSpPr>
         <p:spPr>
-          <a:xfrm rot="16200000" flipH="1">
-            <a:off x="4735828" y="962997"/>
-            <a:ext cx="791185" cy="464634"/>
+          <a:xfrm flipV="1">
+            <a:off x="2935822" y="1460593"/>
+            <a:ext cx="2728455" cy="2262468"/>
           </a:xfrm>
           <a:prstGeom prst="bentConnector3">
-            <a:avLst>
-              <a:gd name="adj1" fmla="val 50000"/>
-            </a:avLst>
+            <a:avLst/>
           </a:prstGeom>
           <a:ln>
+            <a:prstDash val="dash"/>
+            <a:headEnd type="triangle"/>
             <a:tailEnd type="triangle"/>
           </a:ln>
         </p:spPr>
@@ -8358,31 +7755,31 @@
       </p:cxnSp>
       <p:cxnSp>
         <p:nvCxnSpPr>
-          <p:cNvPr id="36" name="Connector: Elbow 35">
+          <p:cNvPr id="34" name="Connector: Elbow 33">
             <a:extLst>
               <a:ext uri="{FF2B5EF4-FFF2-40B4-BE49-F238E27FC236}">
-                <a16:creationId xmlns:a16="http://schemas.microsoft.com/office/drawing/2014/main" id="{5AF505D8-51D7-A217-3832-3190D876DE53}"/>
+                <a16:creationId xmlns:a16="http://schemas.microsoft.com/office/drawing/2014/main" id="{28C1E6AA-5316-DE8D-935C-623DA1AD77FA}"/>
               </a:ext>
             </a:extLst>
           </p:cNvPr>
           <p:cNvCxnSpPr>
             <a:cxnSpLocks/>
-            <a:stCxn id="5" idx="2"/>
-            <a:endCxn id="13" idx="0"/>
+            <a:stCxn id="2" idx="3"/>
+            <a:endCxn id="4" idx="1"/>
           </p:cNvCxnSpPr>
           <p:nvPr/>
         </p:nvCxnSpPr>
         <p:spPr>
-          <a:xfrm rot="5400000">
-            <a:off x="3748945" y="440748"/>
-            <a:ext cx="791185" cy="1509132"/>
+          <a:xfrm flipV="1">
+            <a:off x="2935822" y="2040756"/>
+            <a:ext cx="2728455" cy="1682305"/>
           </a:xfrm>
           <a:prstGeom prst="bentConnector3">
-            <a:avLst>
-              <a:gd name="adj1" fmla="val 50000"/>
-            </a:avLst>
+            <a:avLst/>
           </a:prstGeom>
           <a:ln>
+            <a:prstDash val="dash"/>
+            <a:headEnd type="triangle"/>
             <a:tailEnd type="triangle"/>
           </a:ln>
         </p:spPr>
@@ -8401,6 +7798,185 @@
           </a:fontRef>
         </p:style>
       </p:cxnSp>
+      <p:cxnSp>
+        <p:nvCxnSpPr>
+          <p:cNvPr id="38" name="Connector: Elbow 37">
+            <a:extLst>
+              <a:ext uri="{FF2B5EF4-FFF2-40B4-BE49-F238E27FC236}">
+                <a16:creationId xmlns:a16="http://schemas.microsoft.com/office/drawing/2014/main" id="{BA4B87E2-1AAD-C497-2FA3-999F2E02E6D1}"/>
+              </a:ext>
+            </a:extLst>
+          </p:cNvPr>
+          <p:cNvCxnSpPr>
+            <a:cxnSpLocks/>
+            <a:stCxn id="2" idx="3"/>
+            <a:endCxn id="8" idx="1"/>
+          </p:cNvCxnSpPr>
+          <p:nvPr/>
+        </p:nvCxnSpPr>
+        <p:spPr>
+          <a:xfrm flipV="1">
+            <a:off x="2935822" y="2620919"/>
+            <a:ext cx="2728455" cy="1102142"/>
+          </a:xfrm>
+          <a:prstGeom prst="bentConnector3">
+            <a:avLst/>
+          </a:prstGeom>
+          <a:ln>
+            <a:prstDash val="dash"/>
+            <a:headEnd type="triangle"/>
+            <a:tailEnd type="triangle"/>
+          </a:ln>
+        </p:spPr>
+        <p:style>
+          <a:lnRef idx="1">
+            <a:schemeClr val="dk1"/>
+          </a:lnRef>
+          <a:fillRef idx="0">
+            <a:schemeClr val="dk1"/>
+          </a:fillRef>
+          <a:effectRef idx="0">
+            <a:schemeClr val="dk1"/>
+          </a:effectRef>
+          <a:fontRef idx="minor">
+            <a:schemeClr val="tx1"/>
+          </a:fontRef>
+        </p:style>
+      </p:cxnSp>
+      <p:cxnSp>
+        <p:nvCxnSpPr>
+          <p:cNvPr id="41" name="Connector: Elbow 40">
+            <a:extLst>
+              <a:ext uri="{FF2B5EF4-FFF2-40B4-BE49-F238E27FC236}">
+                <a16:creationId xmlns:a16="http://schemas.microsoft.com/office/drawing/2014/main" id="{D3E30319-C13A-5802-F558-C9FB7A33BA80}"/>
+              </a:ext>
+            </a:extLst>
+          </p:cNvPr>
+          <p:cNvCxnSpPr>
+            <a:cxnSpLocks/>
+            <a:stCxn id="2" idx="3"/>
+            <a:endCxn id="9" idx="1"/>
+          </p:cNvCxnSpPr>
+          <p:nvPr/>
+        </p:nvCxnSpPr>
+        <p:spPr>
+          <a:xfrm>
+            <a:off x="2935822" y="3723061"/>
+            <a:ext cx="2728455" cy="622336"/>
+          </a:xfrm>
+          <a:prstGeom prst="bentConnector3">
+            <a:avLst/>
+          </a:prstGeom>
+          <a:ln>
+            <a:prstDash val="dash"/>
+            <a:headEnd type="triangle"/>
+            <a:tailEnd type="triangle"/>
+          </a:ln>
+        </p:spPr>
+        <p:style>
+          <a:lnRef idx="1">
+            <a:schemeClr val="dk1"/>
+          </a:lnRef>
+          <a:fillRef idx="0">
+            <a:schemeClr val="dk1"/>
+          </a:fillRef>
+          <a:effectRef idx="0">
+            <a:schemeClr val="dk1"/>
+          </a:effectRef>
+          <a:fontRef idx="minor">
+            <a:schemeClr val="tx1"/>
+          </a:fontRef>
+        </p:style>
+      </p:cxnSp>
+      <p:sp>
+        <p:nvSpPr>
+          <p:cNvPr id="44" name="TextBox 43">
+            <a:extLst>
+              <a:ext uri="{FF2B5EF4-FFF2-40B4-BE49-F238E27FC236}">
+                <a16:creationId xmlns:a16="http://schemas.microsoft.com/office/drawing/2014/main" id="{AD3A725F-8435-456B-F631-6EE16D67CEE8}"/>
+              </a:ext>
+            </a:extLst>
+          </p:cNvPr>
+          <p:cNvSpPr txBox="1"/>
+          <p:nvPr/>
+        </p:nvSpPr>
+        <p:spPr>
+          <a:xfrm>
+            <a:off x="6971840" y="2544721"/>
+            <a:ext cx="497992" cy="1569660"/>
+          </a:xfrm>
+          <a:prstGeom prst="rect">
+            <a:avLst/>
+          </a:prstGeom>
+          <a:noFill/>
+        </p:spPr>
+        <p:txBody>
+          <a:bodyPr wrap="square" rtlCol="0">
+            <a:spAutoFit/>
+          </a:bodyPr>
+          <a:lstStyle/>
+          <a:p>
+            <a:r>
+              <a:rPr lang="en-US" sz="2400" b="1" dirty="0"/>
+              <a:t>.</a:t>
+            </a:r>
+          </a:p>
+          <a:p>
+            <a:r>
+              <a:rPr lang="en-US" sz="2400" b="1" dirty="0"/>
+              <a:t>.</a:t>
+            </a:r>
+          </a:p>
+          <a:p>
+            <a:r>
+              <a:rPr lang="en-US" sz="2400" b="1" dirty="0"/>
+              <a:t>.</a:t>
+            </a:r>
+          </a:p>
+          <a:p>
+            <a:r>
+              <a:rPr lang="en-US" sz="2400" b="1" dirty="0"/>
+              <a:t>.</a:t>
+            </a:r>
+          </a:p>
+        </p:txBody>
+      </p:sp>
+      <p:sp>
+        <p:nvSpPr>
+          <p:cNvPr id="46" name="TextBox 45">
+            <a:extLst>
+              <a:ext uri="{FF2B5EF4-FFF2-40B4-BE49-F238E27FC236}">
+                <a16:creationId xmlns:a16="http://schemas.microsoft.com/office/drawing/2014/main" id="{0D467F4E-F75D-C313-EF99-44079BA29943}"/>
+              </a:ext>
+            </a:extLst>
+          </p:cNvPr>
+          <p:cNvSpPr txBox="1"/>
+          <p:nvPr/>
+        </p:nvSpPr>
+        <p:spPr>
+          <a:xfrm>
+            <a:off x="3202783" y="3114763"/>
+            <a:ext cx="1330036" cy="523220"/>
+          </a:xfrm>
+          <a:prstGeom prst="rect">
+            <a:avLst/>
+          </a:prstGeom>
+          <a:noFill/>
+        </p:spPr>
+        <p:txBody>
+          <a:bodyPr wrap="square" rtlCol="0">
+            <a:spAutoFit/>
+          </a:bodyPr>
+          <a:lstStyle/>
+          <a:p>
+            <a:pPr algn="ctr"/>
+            <a:r>
+              <a:rPr lang="en-US" dirty="0"/>
+              <a:t>Cosine Similarity</a:t>
+            </a:r>
+          </a:p>
+        </p:txBody>
+      </p:sp>
     </p:spTree>
     <p:extLst>
       <p:ext uri="{BB962C8B-B14F-4D97-AF65-F5344CB8AC3E}">
@@ -8587,8 +8163,25 @@
                   <a:schemeClr val="tx1"/>
                 </a:solidFill>
               </a:rPr>
-              <a:t>Document Fetcher</a:t>
-            </a:r>
+              <a:t>Document </a:t>
+            </a:r>
+            <a:r>
+              <a:rPr lang="en" sz="1400" dirty="0">
+                <a:solidFill>
+                  <a:srgbClr val="1E1E1E"/>
+                </a:solidFill>
+                <a:latin typeface="Google Sans"/>
+                <a:ea typeface="Google Sans"/>
+                <a:cs typeface="Google Sans"/>
+                <a:sym typeface="Google Sans"/>
+              </a:rPr>
+              <a:t>Retriever</a:t>
+            </a:r>
+            <a:endParaRPr lang="en-US" dirty="0">
+              <a:solidFill>
+                <a:schemeClr val="tx1"/>
+              </a:solidFill>
+            </a:endParaRPr>
           </a:p>
         </p:txBody>
       </p:sp>
@@ -9445,417 +9038,6 @@
   <p:cSld>
     <p:spTree>
       <p:nvGrpSpPr>
-        <p:cNvPr id="1" name=""/>
-        <p:cNvGrpSpPr/>
-        <p:nvPr/>
-      </p:nvGrpSpPr>
-      <p:grpSpPr>
-        <a:xfrm>
-          <a:off x="0" y="0"/>
-          <a:ext cx="0" cy="0"/>
-          <a:chOff x="0" y="0"/>
-          <a:chExt cx="0" cy="0"/>
-        </a:xfrm>
-      </p:grpSpPr>
-      <p:sp>
-        <p:nvSpPr>
-          <p:cNvPr id="7" name="Rectangle 6">
-            <a:extLst>
-              <a:ext uri="{FF2B5EF4-FFF2-40B4-BE49-F238E27FC236}">
-                <a16:creationId xmlns:a16="http://schemas.microsoft.com/office/drawing/2014/main" id="{B53BF7C3-4D8C-28E1-86E7-079B700B3B37}"/>
-              </a:ext>
-            </a:extLst>
-          </p:cNvPr>
-          <p:cNvSpPr/>
-          <p:nvPr/>
-        </p:nvSpPr>
-        <p:spPr>
-          <a:xfrm>
-            <a:off x="0" y="0"/>
-            <a:ext cx="9144000" cy="5143500"/>
-          </a:xfrm>
-          <a:prstGeom prst="rect">
-            <a:avLst/>
-          </a:prstGeom>
-          <a:noFill/>
-          <a:ln>
-            <a:noFill/>
-          </a:ln>
-        </p:spPr>
-        <p:style>
-          <a:lnRef idx="2">
-            <a:schemeClr val="accent1">
-              <a:shade val="15000"/>
-            </a:schemeClr>
-          </a:lnRef>
-          <a:fillRef idx="1">
-            <a:schemeClr val="accent1"/>
-          </a:fillRef>
-          <a:effectRef idx="0">
-            <a:schemeClr val="accent1"/>
-          </a:effectRef>
-          <a:fontRef idx="minor">
-            <a:schemeClr val="lt1"/>
-          </a:fontRef>
-        </p:style>
-        <p:txBody>
-          <a:bodyPr rtlCol="0" anchor="ctr"/>
-          <a:lstStyle/>
-          <a:p>
-            <a:pPr algn="ctr"/>
-            <a:r>
-              <a:rPr lang="en-US" dirty="0">
-                <a:noFill/>
-              </a:rPr>
-              <a:t>Prompt Creator</a:t>
-            </a:r>
-          </a:p>
-        </p:txBody>
-      </p:sp>
-      <p:sp>
-        <p:nvSpPr>
-          <p:cNvPr id="14" name="Google Shape;296;p37">
-            <a:extLst>
-              <a:ext uri="{FF2B5EF4-FFF2-40B4-BE49-F238E27FC236}">
-                <a16:creationId xmlns:a16="http://schemas.microsoft.com/office/drawing/2014/main" id="{5B64C034-EA4E-17AB-AF96-835961A7B018}"/>
-              </a:ext>
-            </a:extLst>
-          </p:cNvPr>
-          <p:cNvSpPr/>
-          <p:nvPr/>
-        </p:nvSpPr>
-        <p:spPr>
-          <a:xfrm>
-            <a:off x="332199" y="1292675"/>
-            <a:ext cx="8454961" cy="3527100"/>
-          </a:xfrm>
-          <a:prstGeom prst="roundRect">
-            <a:avLst>
-              <a:gd name="adj" fmla="val 4197"/>
-            </a:avLst>
-          </a:prstGeom>
-          <a:solidFill>
-            <a:srgbClr val="5CDB6D"/>
-          </a:solidFill>
-          <a:ln w="19050" cap="flat" cmpd="sng">
-            <a:solidFill>
-              <a:srgbClr val="1E1E1E"/>
-            </a:solidFill>
-            <a:prstDash val="solid"/>
-            <a:round/>
-            <a:headEnd type="none" w="sm" len="sm"/>
-            <a:tailEnd type="none" w="sm" len="sm"/>
-          </a:ln>
-        </p:spPr>
-        <p:txBody>
-          <a:bodyPr spcFirstLastPara="1" wrap="square" lIns="91425" tIns="91425" rIns="91425" bIns="91425" anchor="ctr" anchorCtr="0">
-            <a:noAutofit/>
-          </a:bodyPr>
-          <a:lstStyle/>
-          <a:p>
-            <a:pPr marL="0" lvl="0" indent="0" algn="ctr" rtl="0">
-              <a:spcBef>
-                <a:spcPts val="0"/>
-              </a:spcBef>
-              <a:spcAft>
-                <a:spcPts val="0"/>
-              </a:spcAft>
-              <a:buNone/>
-            </a:pPr>
-            <a:endParaRPr>
-              <a:latin typeface="Roboto Mono Light"/>
-              <a:ea typeface="Roboto Mono Light"/>
-              <a:cs typeface="Roboto Mono Light"/>
-              <a:sym typeface="Roboto Mono Light"/>
-            </a:endParaRPr>
-          </a:p>
-        </p:txBody>
-      </p:sp>
-      <p:sp>
-        <p:nvSpPr>
-          <p:cNvPr id="16" name="Google Shape;298;p37">
-            <a:extLst>
-              <a:ext uri="{FF2B5EF4-FFF2-40B4-BE49-F238E27FC236}">
-                <a16:creationId xmlns:a16="http://schemas.microsoft.com/office/drawing/2014/main" id="{72DA094D-73E3-37A3-4316-3B3FDF13D0BA}"/>
-              </a:ext>
-            </a:extLst>
-          </p:cNvPr>
-          <p:cNvSpPr/>
-          <p:nvPr/>
-        </p:nvSpPr>
-        <p:spPr>
-          <a:xfrm>
-            <a:off x="332199" y="323700"/>
-            <a:ext cx="8454961" cy="693900"/>
-          </a:xfrm>
-          <a:prstGeom prst="roundRect">
-            <a:avLst>
-              <a:gd name="adj" fmla="val 28113"/>
-            </a:avLst>
-          </a:prstGeom>
-          <a:solidFill>
-            <a:schemeClr val="lt1"/>
-          </a:solidFill>
-          <a:ln w="19050" cap="flat" cmpd="sng">
-            <a:solidFill>
-              <a:srgbClr val="1E1E1E"/>
-            </a:solidFill>
-            <a:prstDash val="solid"/>
-            <a:round/>
-            <a:headEnd type="none" w="sm" len="sm"/>
-            <a:tailEnd type="none" w="sm" len="sm"/>
-          </a:ln>
-        </p:spPr>
-        <p:txBody>
-          <a:bodyPr spcFirstLastPara="1" wrap="square" lIns="91425" tIns="91425" rIns="91425" bIns="91425" anchor="ctr" anchorCtr="0">
-            <a:noAutofit/>
-          </a:bodyPr>
-          <a:lstStyle/>
-          <a:p>
-            <a:pPr marL="0" lvl="0" indent="0" algn="l" rtl="0">
-              <a:spcBef>
-                <a:spcPts val="0"/>
-              </a:spcBef>
-              <a:spcAft>
-                <a:spcPts val="0"/>
-              </a:spcAft>
-              <a:buNone/>
-            </a:pPr>
-            <a:r>
-              <a:rPr lang="en" sz="2500" dirty="0">
-                <a:solidFill>
-                  <a:srgbClr val="1E1E1E"/>
-                </a:solidFill>
-                <a:latin typeface="Google Sans"/>
-                <a:ea typeface="Google Sans"/>
-                <a:cs typeface="Google Sans"/>
-                <a:sym typeface="Google Sans"/>
-              </a:rPr>
-              <a:t>Prompt Creator: G-Electronics</a:t>
-            </a:r>
-            <a:endParaRPr dirty="0">
-              <a:solidFill>
-                <a:srgbClr val="1E1E1E"/>
-              </a:solidFill>
-              <a:latin typeface="Roboto Mono Light"/>
-              <a:ea typeface="Roboto Mono Light"/>
-              <a:cs typeface="Roboto Mono Light"/>
-              <a:sym typeface="Roboto Mono Light"/>
-            </a:endParaRPr>
-          </a:p>
-        </p:txBody>
-      </p:sp>
-      <p:sp>
-        <p:nvSpPr>
-          <p:cNvPr id="20" name="Google Shape;291;p36">
-            <a:extLst>
-              <a:ext uri="{FF2B5EF4-FFF2-40B4-BE49-F238E27FC236}">
-                <a16:creationId xmlns:a16="http://schemas.microsoft.com/office/drawing/2014/main" id="{C180CF55-EC2A-83E4-B92E-D9010197AD56}"/>
-              </a:ext>
-            </a:extLst>
-          </p:cNvPr>
-          <p:cNvSpPr txBox="1">
-            <a:spLocks noGrp="1"/>
-          </p:cNvSpPr>
-          <p:nvPr>
-            <p:ph type="body" idx="1"/>
-          </p:nvPr>
-        </p:nvSpPr>
-        <p:spPr>
-          <a:xfrm>
-            <a:off x="446049" y="1383702"/>
-            <a:ext cx="7915253" cy="3345046"/>
-          </a:xfrm>
-          <a:prstGeom prst="rect">
-            <a:avLst/>
-          </a:prstGeom>
-          <a:noFill/>
-        </p:spPr>
-        <p:txBody>
-          <a:bodyPr spcFirstLastPara="1" wrap="square" lIns="91425" tIns="91425" rIns="91425" bIns="91425" anchor="t" anchorCtr="0">
-            <a:noAutofit/>
-          </a:bodyPr>
-          <a:lstStyle/>
-          <a:p>
-            <a:pPr marL="0" indent="0">
-              <a:spcAft>
-                <a:spcPts val="1200"/>
-              </a:spcAft>
-              <a:buClrTx/>
-              <a:buSzPct val="140000"/>
-              <a:buNone/>
-            </a:pPr>
-            <a:r>
-              <a:rPr lang="en-US" sz="1500" dirty="0">
-                <a:solidFill>
-                  <a:schemeClr val="tx1"/>
-                </a:solidFill>
-                <a:latin typeface="Google Sans"/>
-                <a:ea typeface="Google Sans"/>
-                <a:cs typeface="Google Sans"/>
-              </a:rPr>
-              <a:t>You are G-Electronics GPT. You answer questions about electronics and recommend electronics from our stores to the user. You will also give expert advise on anything about electronics….</a:t>
-            </a:r>
-          </a:p>
-          <a:p>
-            <a:pPr marL="0" indent="0">
-              <a:spcAft>
-                <a:spcPts val="1200"/>
-              </a:spcAft>
-              <a:buClrTx/>
-              <a:buSzPct val="140000"/>
-              <a:buNone/>
-            </a:pPr>
-            <a:r>
-              <a:rPr lang="en-US" sz="1500" dirty="0">
-                <a:solidFill>
-                  <a:schemeClr val="tx1"/>
-                </a:solidFill>
-                <a:latin typeface="Google Sans"/>
-                <a:ea typeface="Google Sans"/>
-                <a:cs typeface="Google Sans"/>
-              </a:rPr>
-              <a:t>We sell TVs, Mobile phones, and home appliances such as refrigerators and microwaves….</a:t>
-            </a:r>
-          </a:p>
-          <a:p>
-            <a:pPr marL="0" indent="0">
-              <a:spcAft>
-                <a:spcPts val="1200"/>
-              </a:spcAft>
-              <a:buClrTx/>
-              <a:buSzPct val="140000"/>
-              <a:buNone/>
-            </a:pPr>
-            <a:r>
-              <a:rPr lang="en-US" sz="1500" dirty="0">
-                <a:solidFill>
-                  <a:schemeClr val="tx1"/>
-                </a:solidFill>
-                <a:latin typeface="Google Sans"/>
-                <a:ea typeface="Google Sans"/>
-                <a:cs typeface="Google Sans"/>
-                <a:sym typeface="Google Sans"/>
-              </a:rPr>
-              <a:t>Here are the products we sell that may be relevant to the user:</a:t>
-            </a:r>
-          </a:p>
-          <a:p>
-            <a:pPr marL="0" indent="0">
-              <a:spcAft>
-                <a:spcPts val="1200"/>
-              </a:spcAft>
-              <a:buClrTx/>
-              <a:buSzPct val="140000"/>
-              <a:buNone/>
-            </a:pPr>
-            <a:r>
-              <a:rPr lang="en-US" sz="1500" dirty="0">
-                <a:solidFill>
-                  <a:schemeClr val="tx1"/>
-                </a:solidFill>
-                <a:latin typeface="Google Sans"/>
-                <a:ea typeface="Google Sans"/>
-                <a:cs typeface="Google Sans"/>
-                <a:sym typeface="Google Sans"/>
-              </a:rPr>
-              <a:t>…..</a:t>
-            </a:r>
-          </a:p>
-          <a:p>
-            <a:pPr marL="0" indent="0">
-              <a:spcAft>
-                <a:spcPts val="1200"/>
-              </a:spcAft>
-              <a:buClrTx/>
-              <a:buSzPct val="140000"/>
-              <a:buNone/>
-            </a:pPr>
-            <a:r>
-              <a:rPr lang="en-US" sz="1500" dirty="0">
-                <a:solidFill>
-                  <a:schemeClr val="tx1"/>
-                </a:solidFill>
-                <a:latin typeface="Google Sans"/>
-                <a:ea typeface="Google Sans"/>
-                <a:cs typeface="Google Sans"/>
-                <a:sym typeface="Google Sans"/>
-              </a:rPr>
-              <a:t>Here are the latest products by the brand requested by the user:</a:t>
-            </a:r>
-          </a:p>
-          <a:p>
-            <a:pPr marL="0" indent="0">
-              <a:spcAft>
-                <a:spcPts val="1200"/>
-              </a:spcAft>
-              <a:buClrTx/>
-              <a:buSzPct val="140000"/>
-              <a:buNone/>
-            </a:pPr>
-            <a:r>
-              <a:rPr lang="en-US" sz="1500" dirty="0">
-                <a:solidFill>
-                  <a:schemeClr val="tx1"/>
-                </a:solidFill>
-                <a:latin typeface="Google Sans"/>
-                <a:ea typeface="Google Sans"/>
-                <a:cs typeface="Google Sans"/>
-                <a:sym typeface="Google Sans"/>
-              </a:rPr>
-              <a:t>….</a:t>
-            </a:r>
-          </a:p>
-          <a:p>
-            <a:pPr marL="0" indent="0">
-              <a:spcAft>
-                <a:spcPts val="1200"/>
-              </a:spcAft>
-              <a:buClrTx/>
-              <a:buSzPct val="140000"/>
-              <a:buNone/>
-            </a:pPr>
-            <a:r>
-              <a:rPr lang="en-US" sz="1500" dirty="0">
-                <a:solidFill>
-                  <a:schemeClr val="tx1"/>
-                </a:solidFill>
-                <a:latin typeface="Google Sans"/>
-                <a:ea typeface="Google Sans"/>
-                <a:cs typeface="Google Sans"/>
-              </a:rPr>
-              <a:t>Here is the user’s intent identified: …..</a:t>
-            </a:r>
-            <a:endParaRPr lang="en-US" sz="1500" dirty="0">
-              <a:solidFill>
-                <a:schemeClr val="tx1"/>
-              </a:solidFill>
-              <a:latin typeface="Google Sans"/>
-              <a:ea typeface="Google Sans"/>
-              <a:cs typeface="Google Sans"/>
-              <a:sym typeface="Google Sans"/>
-            </a:endParaRPr>
-          </a:p>
-        </p:txBody>
-      </p:sp>
-    </p:spTree>
-    <p:extLst>
-      <p:ext uri="{BB962C8B-B14F-4D97-AF65-F5344CB8AC3E}">
-        <p14:creationId xmlns:p14="http://schemas.microsoft.com/office/powerpoint/2010/main" val="2834105439"/>
-      </p:ext>
-    </p:extLst>
-  </p:cSld>
-  <p:clrMapOvr>
-    <a:masterClrMapping/>
-  </p:clrMapOvr>
-</p:sld>
-</file>
-
-<file path=ppt/slides/slide14.xml><?xml version="1.0" encoding="utf-8"?>
-<p:sld xmlns:a="http://schemas.openxmlformats.org/drawingml/2006/main" xmlns:r="http://schemas.openxmlformats.org/officeDocument/2006/relationships" xmlns:p="http://schemas.openxmlformats.org/presentationml/2006/main">
-  <p:cSld>
-    <p:spTree>
-      <p:nvGrpSpPr>
         <p:cNvPr id="1" name="">
           <a:extLst>
             <a:ext uri="{FF2B5EF4-FFF2-40B4-BE49-F238E27FC236}">
@@ -10024,8 +9206,25 @@
                   <a:schemeClr val="tx1"/>
                 </a:solidFill>
               </a:rPr>
-              <a:t>Document Fetcher</a:t>
-            </a:r>
+              <a:t>Document </a:t>
+            </a:r>
+            <a:r>
+              <a:rPr lang="en" sz="1400" dirty="0">
+                <a:solidFill>
+                  <a:srgbClr val="1E1E1E"/>
+                </a:solidFill>
+                <a:latin typeface="Google Sans"/>
+                <a:ea typeface="Google Sans"/>
+                <a:cs typeface="Google Sans"/>
+                <a:sym typeface="Google Sans"/>
+              </a:rPr>
+              <a:t>Retriever</a:t>
+            </a:r>
+            <a:endParaRPr lang="en-US" dirty="0">
+              <a:solidFill>
+                <a:schemeClr val="tx1"/>
+              </a:solidFill>
+            </a:endParaRPr>
           </a:p>
         </p:txBody>
       </p:sp>
@@ -10456,7 +9655,7 @@
 </p:sld>
 </file>
 
-<file path=ppt/slides/slide15.xml><?xml version="1.0" encoding="utf-8"?>
+<file path=ppt/slides/slide14.xml><?xml version="1.0" encoding="utf-8"?>
 <p:sld xmlns:a="http://schemas.openxmlformats.org/drawingml/2006/main" xmlns:r="http://schemas.openxmlformats.org/officeDocument/2006/relationships" xmlns:p="http://schemas.openxmlformats.org/presentationml/2006/main">
   <p:cSld>
     <p:spTree>
@@ -10695,7 +9894,7 @@
             </a:pPr>
             <a:r>
               <a:rPr lang="en-US" sz="1800" dirty="0"/>
-              <a:t>Send the prompt to the LLM model along with message history</a:t>
+              <a:t>Send the prompt to the LLM model [along with message history]</a:t>
             </a:r>
           </a:p>
           <a:p>
@@ -10719,7 +9918,7 @@
             </a:pPr>
             <a:r>
               <a:rPr lang="en-US" sz="1800" dirty="0"/>
-              <a:t>Use frameworks like </a:t>
+              <a:t>Can use frameworks like </a:t>
             </a:r>
             <a:r>
               <a:rPr lang="en-US" sz="1800" dirty="0" err="1"/>
@@ -10764,7 +9963,7 @@
             </a:pPr>
             <a:r>
               <a:rPr lang="en-US" sz="1800" dirty="0"/>
-              <a:t>Send request to LLM (GPT 4o, local hosted LLM, </a:t>
+              <a:t>Send request to LLM (Gemini, Gemma, GPT 4o, local hosted LLM, </a:t>
             </a:r>
             <a:r>
               <a:rPr lang="en-US" sz="1800" dirty="0" err="1"/>
@@ -10816,7 +10015,7 @@
 </p:sld>
 </file>
 
-<file path=ppt/slides/slide16.xml><?xml version="1.0" encoding="utf-8"?>
+<file path=ppt/slides/slide15.xml><?xml version="1.0" encoding="utf-8"?>
 <p:sld xmlns:a="http://schemas.openxmlformats.org/drawingml/2006/main" xmlns:r="http://schemas.openxmlformats.org/officeDocument/2006/relationships" xmlns:p="http://schemas.openxmlformats.org/presentationml/2006/main">
   <p:cSld>
     <p:spTree>
@@ -10989,8 +10188,25 @@
                   <a:schemeClr val="tx1"/>
                 </a:solidFill>
               </a:rPr>
-              <a:t>Document Fetcher</a:t>
-            </a:r>
+              <a:t>Document </a:t>
+            </a:r>
+            <a:r>
+              <a:rPr lang="en" sz="1400" dirty="0">
+                <a:solidFill>
+                  <a:srgbClr val="1E1E1E"/>
+                </a:solidFill>
+                <a:latin typeface="Google Sans"/>
+                <a:ea typeface="Google Sans"/>
+                <a:cs typeface="Google Sans"/>
+                <a:sym typeface="Google Sans"/>
+              </a:rPr>
+              <a:t>Retriever</a:t>
+            </a:r>
+            <a:endParaRPr lang="en-US" dirty="0">
+              <a:solidFill>
+                <a:schemeClr val="tx1"/>
+              </a:solidFill>
+            </a:endParaRPr>
           </a:p>
         </p:txBody>
       </p:sp>
@@ -11421,7 +10637,7 @@
 </p:sld>
 </file>
 
-<file path=ppt/slides/slide17.xml><?xml version="1.0" encoding="utf-8"?>
+<file path=ppt/slides/slide16.xml><?xml version="1.0" encoding="utf-8"?>
 <p:sld xmlns:a="http://schemas.openxmlformats.org/drawingml/2006/main" xmlns:r="http://schemas.openxmlformats.org/officeDocument/2006/relationships" xmlns:p="http://schemas.openxmlformats.org/presentationml/2006/main">
   <p:cSld>
     <p:spTree>
@@ -11819,6 +11035,603 @@
     <p:extLst>
       <p:ext uri="{BB962C8B-B14F-4D97-AF65-F5344CB8AC3E}">
         <p14:creationId xmlns:p14="http://schemas.microsoft.com/office/powerpoint/2010/main" val="3465411207"/>
+      </p:ext>
+    </p:extLst>
+  </p:cSld>
+  <p:clrMapOvr>
+    <a:masterClrMapping/>
+  </p:clrMapOvr>
+  <mc:AlternateContent xmlns:mc="http://schemas.openxmlformats.org/markup-compatibility/2006" xmlns:p159="http://schemas.microsoft.com/office/powerpoint/2015/09/main">
+    <mc:Choice Requires="p159">
+      <p:transition xmlns:p14="http://schemas.microsoft.com/office/powerpoint/2010/main" spd="slow" p14:dur="2000">
+        <p159:morph option="byObject"/>
+      </p:transition>
+    </mc:Choice>
+    <mc:Fallback xmlns="">
+      <p:transition spd="slow">
+        <p:fade/>
+      </p:transition>
+    </mc:Fallback>
+  </mc:AlternateContent>
+</p:sld>
+</file>
+
+<file path=ppt/slides/slide17.xml><?xml version="1.0" encoding="utf-8"?>
+<p:sld xmlns:a="http://schemas.openxmlformats.org/drawingml/2006/main" xmlns:r="http://schemas.openxmlformats.org/officeDocument/2006/relationships" xmlns:p="http://schemas.openxmlformats.org/presentationml/2006/main">
+  <p:cSld>
+    <p:spTree>
+      <p:nvGrpSpPr>
+        <p:cNvPr id="1" name="">
+          <a:extLst>
+            <a:ext uri="{FF2B5EF4-FFF2-40B4-BE49-F238E27FC236}">
+              <a16:creationId xmlns:a16="http://schemas.microsoft.com/office/drawing/2014/main" id="{10C32661-3BEE-F6B8-181A-D83DFD60E1BB}"/>
+            </a:ext>
+          </a:extLst>
+        </p:cNvPr>
+        <p:cNvGrpSpPr/>
+        <p:nvPr/>
+      </p:nvGrpSpPr>
+      <p:grpSpPr>
+        <a:xfrm>
+          <a:off x="0" y="0"/>
+          <a:ext cx="0" cy="0"/>
+          <a:chOff x="0" y="0"/>
+          <a:chExt cx="0" cy="0"/>
+        </a:xfrm>
+      </p:grpSpPr>
+      <p:sp>
+        <p:nvSpPr>
+          <p:cNvPr id="6" name="Rectangle 5">
+            <a:extLst>
+              <a:ext uri="{FF2B5EF4-FFF2-40B4-BE49-F238E27FC236}">
+                <a16:creationId xmlns:a16="http://schemas.microsoft.com/office/drawing/2014/main" id="{B331AF2E-6921-AA27-BD8C-9D4E0FD45F7C}"/>
+              </a:ext>
+            </a:extLst>
+          </p:cNvPr>
+          <p:cNvSpPr/>
+          <p:nvPr/>
+        </p:nvSpPr>
+        <p:spPr>
+          <a:xfrm>
+            <a:off x="0" y="0"/>
+            <a:ext cx="9144000" cy="5143500"/>
+          </a:xfrm>
+          <a:prstGeom prst="rect">
+            <a:avLst/>
+          </a:prstGeom>
+          <a:noFill/>
+          <a:ln>
+            <a:noFill/>
+          </a:ln>
+        </p:spPr>
+        <p:style>
+          <a:lnRef idx="2">
+            <a:schemeClr val="accent1">
+              <a:shade val="15000"/>
+            </a:schemeClr>
+          </a:lnRef>
+          <a:fillRef idx="1">
+            <a:schemeClr val="accent1"/>
+          </a:fillRef>
+          <a:effectRef idx="0">
+            <a:schemeClr val="accent1"/>
+          </a:effectRef>
+          <a:fontRef idx="minor">
+            <a:schemeClr val="lt1"/>
+          </a:fontRef>
+        </p:style>
+        <p:txBody>
+          <a:bodyPr rtlCol="0" anchor="ctr"/>
+          <a:lstStyle/>
+          <a:p>
+            <a:pPr algn="ctr"/>
+            <a:r>
+              <a:rPr lang="en-US" dirty="0">
+                <a:noFill/>
+              </a:rPr>
+              <a:t>Document Fetcher</a:t>
+            </a:r>
+          </a:p>
+        </p:txBody>
+      </p:sp>
+      <p:sp>
+        <p:nvSpPr>
+          <p:cNvPr id="3" name="Rectangle 2">
+            <a:extLst>
+              <a:ext uri="{FF2B5EF4-FFF2-40B4-BE49-F238E27FC236}">
+                <a16:creationId xmlns:a16="http://schemas.microsoft.com/office/drawing/2014/main" id="{84F3037C-5B0A-2793-DA0D-3B372CE498E8}"/>
+              </a:ext>
+            </a:extLst>
+          </p:cNvPr>
+          <p:cNvSpPr/>
+          <p:nvPr/>
+        </p:nvSpPr>
+        <p:spPr>
+          <a:xfrm>
+            <a:off x="3129775" y="441867"/>
+            <a:ext cx="2401229" cy="468351"/>
+          </a:xfrm>
+          <a:prstGeom prst="rect">
+            <a:avLst/>
+          </a:prstGeom>
+          <a:noFill/>
+          <a:ln>
+            <a:noFill/>
+          </a:ln>
+        </p:spPr>
+        <p:style>
+          <a:lnRef idx="2">
+            <a:schemeClr val="accent1">
+              <a:shade val="15000"/>
+            </a:schemeClr>
+          </a:lnRef>
+          <a:fillRef idx="1">
+            <a:schemeClr val="accent1"/>
+          </a:fillRef>
+          <a:effectRef idx="0">
+            <a:schemeClr val="accent1"/>
+          </a:effectRef>
+          <a:fontRef idx="minor">
+            <a:schemeClr val="lt1"/>
+          </a:fontRef>
+        </p:style>
+        <p:txBody>
+          <a:bodyPr rtlCol="0" anchor="ctr"/>
+          <a:lstStyle/>
+          <a:p>
+            <a:pPr algn="ctr"/>
+            <a:endParaRPr lang="en-US" dirty="0"/>
+          </a:p>
+        </p:txBody>
+      </p:sp>
+      <p:sp>
+        <p:nvSpPr>
+          <p:cNvPr id="14" name="Google Shape;288;p36">
+            <a:extLst>
+              <a:ext uri="{FF2B5EF4-FFF2-40B4-BE49-F238E27FC236}">
+                <a16:creationId xmlns:a16="http://schemas.microsoft.com/office/drawing/2014/main" id="{0282E36C-908F-F713-9906-A3EAB63E941F}"/>
+              </a:ext>
+            </a:extLst>
+          </p:cNvPr>
+          <p:cNvSpPr/>
+          <p:nvPr/>
+        </p:nvSpPr>
+        <p:spPr>
+          <a:xfrm>
+            <a:off x="332200" y="1292675"/>
+            <a:ext cx="8224502" cy="3527100"/>
+          </a:xfrm>
+          <a:prstGeom prst="roundRect">
+            <a:avLst>
+              <a:gd name="adj" fmla="val 4197"/>
+            </a:avLst>
+          </a:prstGeom>
+          <a:solidFill>
+            <a:srgbClr val="FFE7A5"/>
+          </a:solidFill>
+          <a:ln w="19050" cap="flat" cmpd="sng">
+            <a:solidFill>
+              <a:srgbClr val="1E1E1E"/>
+            </a:solidFill>
+            <a:prstDash val="solid"/>
+            <a:round/>
+            <a:headEnd type="none" w="sm" len="sm"/>
+            <a:tailEnd type="none" w="sm" len="sm"/>
+          </a:ln>
+        </p:spPr>
+        <p:txBody>
+          <a:bodyPr spcFirstLastPara="1" wrap="square" lIns="91425" tIns="91425" rIns="91425" bIns="91425" anchor="ctr" anchorCtr="0">
+            <a:noAutofit/>
+          </a:bodyPr>
+          <a:lstStyle/>
+          <a:p>
+            <a:pPr marL="0" lvl="0" indent="0" algn="ctr" rtl="0">
+              <a:spcBef>
+                <a:spcPts val="0"/>
+              </a:spcBef>
+              <a:spcAft>
+                <a:spcPts val="0"/>
+              </a:spcAft>
+              <a:buNone/>
+            </a:pPr>
+            <a:endParaRPr dirty="0">
+              <a:latin typeface="Roboto Mono Light"/>
+              <a:ea typeface="Roboto Mono Light"/>
+              <a:cs typeface="Roboto Mono Light"/>
+              <a:sym typeface="Roboto Mono Light"/>
+            </a:endParaRPr>
+          </a:p>
+        </p:txBody>
+      </p:sp>
+      <p:sp>
+        <p:nvSpPr>
+          <p:cNvPr id="18" name="Google Shape;290;p36">
+            <a:extLst>
+              <a:ext uri="{FF2B5EF4-FFF2-40B4-BE49-F238E27FC236}">
+                <a16:creationId xmlns:a16="http://schemas.microsoft.com/office/drawing/2014/main" id="{40C382E7-7B01-2519-2952-72E76153738F}"/>
+              </a:ext>
+            </a:extLst>
+          </p:cNvPr>
+          <p:cNvSpPr/>
+          <p:nvPr/>
+        </p:nvSpPr>
+        <p:spPr>
+          <a:xfrm>
+            <a:off x="332200" y="323700"/>
+            <a:ext cx="8471000" cy="693900"/>
+          </a:xfrm>
+          <a:prstGeom prst="roundRect">
+            <a:avLst>
+              <a:gd name="adj" fmla="val 28113"/>
+            </a:avLst>
+          </a:prstGeom>
+          <a:solidFill>
+            <a:schemeClr val="lt1"/>
+          </a:solidFill>
+          <a:ln w="19050" cap="flat" cmpd="sng">
+            <a:solidFill>
+              <a:srgbClr val="1E1E1E"/>
+            </a:solidFill>
+            <a:prstDash val="solid"/>
+            <a:round/>
+            <a:headEnd type="none" w="sm" len="sm"/>
+            <a:tailEnd type="none" w="sm" len="sm"/>
+          </a:ln>
+        </p:spPr>
+        <p:txBody>
+          <a:bodyPr spcFirstLastPara="1" wrap="square" lIns="91425" tIns="91425" rIns="91425" bIns="91425" anchor="ctr" anchorCtr="0">
+            <a:noAutofit/>
+          </a:bodyPr>
+          <a:lstStyle/>
+          <a:p>
+            <a:pPr marL="0" lvl="0" indent="0" algn="l" rtl="0">
+              <a:spcBef>
+                <a:spcPts val="0"/>
+              </a:spcBef>
+              <a:spcAft>
+                <a:spcPts val="0"/>
+              </a:spcAft>
+              <a:buClr>
+                <a:schemeClr val="dk1"/>
+              </a:buClr>
+              <a:buSzPts val="1100"/>
+              <a:buFont typeface="Arial"/>
+              <a:buNone/>
+            </a:pPr>
+            <a:r>
+              <a:rPr lang="en" sz="2500" dirty="0">
+                <a:solidFill>
+                  <a:srgbClr val="1E1E1E"/>
+                </a:solidFill>
+                <a:latin typeface="Google Sans"/>
+                <a:ea typeface="Google Sans"/>
+                <a:cs typeface="Google Sans"/>
+                <a:sym typeface="Google Sans"/>
+              </a:rPr>
+              <a:t>Let’s Code!</a:t>
+            </a:r>
+            <a:endParaRPr dirty="0">
+              <a:solidFill>
+                <a:srgbClr val="1E1E1E"/>
+              </a:solidFill>
+              <a:latin typeface="Roboto Mono Light"/>
+              <a:ea typeface="Roboto Mono Light"/>
+              <a:cs typeface="Roboto Mono Light"/>
+              <a:sym typeface="Roboto Mono Light"/>
+            </a:endParaRPr>
+          </a:p>
+        </p:txBody>
+      </p:sp>
+      <p:sp>
+        <p:nvSpPr>
+          <p:cNvPr id="20" name="Google Shape;291;p36">
+            <a:extLst>
+              <a:ext uri="{FF2B5EF4-FFF2-40B4-BE49-F238E27FC236}">
+                <a16:creationId xmlns:a16="http://schemas.microsoft.com/office/drawing/2014/main" id="{1B0547D7-6A0B-9BC5-E057-4764847D032B}"/>
+              </a:ext>
+            </a:extLst>
+          </p:cNvPr>
+          <p:cNvSpPr txBox="1">
+            <a:spLocks noGrp="1"/>
+          </p:cNvSpPr>
+          <p:nvPr>
+            <p:ph type="body" idx="1"/>
+          </p:nvPr>
+        </p:nvSpPr>
+        <p:spPr>
+          <a:xfrm>
+            <a:off x="463909" y="1444654"/>
+            <a:ext cx="7915253" cy="3345046"/>
+          </a:xfrm>
+          <a:prstGeom prst="rect">
+            <a:avLst/>
+          </a:prstGeom>
+          <a:noFill/>
+        </p:spPr>
+        <p:txBody>
+          <a:bodyPr spcFirstLastPara="1" wrap="square" lIns="91425" tIns="91425" rIns="91425" bIns="91425" anchor="t" anchorCtr="0">
+            <a:noAutofit/>
+          </a:bodyPr>
+          <a:lstStyle/>
+          <a:p>
+            <a:pPr marL="342900" indent="-342900">
+              <a:spcAft>
+                <a:spcPts val="600"/>
+              </a:spcAft>
+              <a:buClrTx/>
+              <a:buSzPct val="100000"/>
+              <a:buFont typeface="+mj-lt"/>
+              <a:buAutoNum type="arabicPeriod"/>
+            </a:pPr>
+            <a:r>
+              <a:rPr lang="en-US" sz="1500" dirty="0">
+                <a:solidFill>
+                  <a:schemeClr val="tx1"/>
+                </a:solidFill>
+                <a:latin typeface="Google Sans"/>
+                <a:ea typeface="Google Sans"/>
+                <a:cs typeface="Google Sans"/>
+                <a:sym typeface="Google Sans"/>
+              </a:rPr>
+              <a:t>Copy </a:t>
+            </a:r>
+            <a:r>
+              <a:rPr lang="en-US" sz="1500" dirty="0" err="1">
+                <a:solidFill>
+                  <a:schemeClr val="tx1"/>
+                </a:solidFill>
+                <a:latin typeface="Google Sans"/>
+                <a:ea typeface="Google Sans"/>
+                <a:cs typeface="Google Sans"/>
+                <a:sym typeface="Google Sans"/>
+              </a:rPr>
+              <a:t>Colab</a:t>
+            </a:r>
+            <a:r>
+              <a:rPr lang="en-US" sz="1500" dirty="0">
+                <a:solidFill>
+                  <a:schemeClr val="tx1"/>
+                </a:solidFill>
+                <a:latin typeface="Google Sans"/>
+                <a:ea typeface="Google Sans"/>
+                <a:cs typeface="Google Sans"/>
+                <a:sym typeface="Google Sans"/>
+              </a:rPr>
+              <a:t> Notebook from: </a:t>
+            </a:r>
+          </a:p>
+          <a:p>
+            <a:pPr marL="342900" indent="-342900">
+              <a:spcAft>
+                <a:spcPts val="600"/>
+              </a:spcAft>
+              <a:buClrTx/>
+              <a:buSzPct val="100000"/>
+              <a:buFont typeface="+mj-lt"/>
+              <a:buAutoNum type="arabicPeriod"/>
+            </a:pPr>
+            <a:r>
+              <a:rPr lang="en-US" sz="1500" dirty="0">
+                <a:solidFill>
+                  <a:schemeClr val="tx1"/>
+                </a:solidFill>
+                <a:latin typeface="Google Sans"/>
+                <a:ea typeface="Google Sans"/>
+                <a:cs typeface="Google Sans"/>
+                <a:sym typeface="Google Sans"/>
+              </a:rPr>
+              <a:t>Get Gemini Access</a:t>
+            </a:r>
+          </a:p>
+          <a:p>
+            <a:pPr marL="800100" lvl="1" indent="-342900">
+              <a:spcAft>
+                <a:spcPts val="600"/>
+              </a:spcAft>
+              <a:buClrTx/>
+              <a:buSzPct val="100000"/>
+              <a:buFont typeface="+mj-lt"/>
+              <a:buAutoNum type="alphaLcPeriod"/>
+            </a:pPr>
+            <a:r>
+              <a:rPr lang="en-US" sz="1500" dirty="0">
+                <a:solidFill>
+                  <a:schemeClr val="tx1"/>
+                </a:solidFill>
+                <a:latin typeface="Google Sans"/>
+                <a:ea typeface="Google Sans"/>
+                <a:cs typeface="Google Sans"/>
+                <a:sym typeface="Google Sans"/>
+              </a:rPr>
+              <a:t>Visit: </a:t>
+            </a:r>
+            <a:r>
+              <a:rPr lang="en-US" sz="1500" dirty="0">
+                <a:solidFill>
+                  <a:schemeClr val="tx1"/>
+                </a:solidFill>
+                <a:latin typeface="Google Sans"/>
+                <a:ea typeface="Google Sans"/>
+                <a:cs typeface="Google Sans"/>
+                <a:sym typeface="Google Sans"/>
+                <a:hlinkClick r:id="rId2"/>
+              </a:rPr>
+              <a:t>https://trygcp.dev/e/build-ai-SHA01</a:t>
+            </a:r>
+            <a:endParaRPr lang="en-US" sz="1500" dirty="0">
+              <a:solidFill>
+                <a:schemeClr val="tx1"/>
+              </a:solidFill>
+              <a:latin typeface="Google Sans"/>
+              <a:ea typeface="Google Sans"/>
+              <a:cs typeface="Google Sans"/>
+              <a:sym typeface="Google Sans"/>
+            </a:endParaRPr>
+          </a:p>
+          <a:p>
+            <a:pPr marL="800100" lvl="1" indent="-342900">
+              <a:spcAft>
+                <a:spcPts val="600"/>
+              </a:spcAft>
+              <a:buClrTx/>
+              <a:buSzPct val="100000"/>
+              <a:buFont typeface="+mj-lt"/>
+              <a:buAutoNum type="alphaLcPeriod"/>
+            </a:pPr>
+            <a:r>
+              <a:rPr lang="en-US" sz="1500" dirty="0">
+                <a:solidFill>
+                  <a:schemeClr val="tx1"/>
+                </a:solidFill>
+                <a:latin typeface="Google Sans"/>
+                <a:ea typeface="Google Sans"/>
+                <a:cs typeface="Google Sans"/>
+                <a:sym typeface="Google Sans"/>
+              </a:rPr>
+              <a:t>Log in with Google – Accept T&amp;C </a:t>
+            </a:r>
+          </a:p>
+          <a:p>
+            <a:pPr marL="342900" indent="-342900">
+              <a:spcAft>
+                <a:spcPts val="600"/>
+              </a:spcAft>
+              <a:buClrTx/>
+              <a:buSzPct val="100000"/>
+              <a:buFont typeface="+mj-lt"/>
+              <a:buAutoNum type="arabicPeriod"/>
+            </a:pPr>
+            <a:r>
+              <a:rPr lang="en-US" sz="1500" dirty="0">
+                <a:solidFill>
+                  <a:schemeClr val="tx1"/>
+                </a:solidFill>
+                <a:latin typeface="Google Sans"/>
+                <a:ea typeface="Google Sans"/>
+                <a:cs typeface="Google Sans"/>
+                <a:sym typeface="Google Sans"/>
+              </a:rPr>
+              <a:t>Download pdfs</a:t>
+            </a:r>
+          </a:p>
+          <a:p>
+            <a:pPr marL="342900" indent="-342900">
+              <a:spcAft>
+                <a:spcPts val="600"/>
+              </a:spcAft>
+              <a:buClrTx/>
+              <a:buSzPct val="100000"/>
+              <a:buFont typeface="+mj-lt"/>
+              <a:buAutoNum type="arabicPeriod"/>
+            </a:pPr>
+            <a:r>
+              <a:rPr lang="en-US" sz="1500" dirty="0">
+                <a:solidFill>
+                  <a:schemeClr val="tx1"/>
+                </a:solidFill>
+                <a:latin typeface="Google Sans"/>
+                <a:ea typeface="Google Sans"/>
+                <a:cs typeface="Google Sans"/>
+                <a:sym typeface="Google Sans"/>
+              </a:rPr>
+              <a:t>Create Index with embeddings of chunked documents</a:t>
+            </a:r>
+          </a:p>
+          <a:p>
+            <a:pPr marL="342900" indent="-342900">
+              <a:spcAft>
+                <a:spcPts val="600"/>
+              </a:spcAft>
+              <a:buClrTx/>
+              <a:buSzPct val="100000"/>
+              <a:buFont typeface="+mj-lt"/>
+              <a:buAutoNum type="arabicPeriod"/>
+            </a:pPr>
+            <a:r>
+              <a:rPr lang="en-US" sz="1500" dirty="0">
+                <a:solidFill>
+                  <a:schemeClr val="tx1"/>
+                </a:solidFill>
+                <a:latin typeface="Google Sans"/>
+                <a:ea typeface="Google Sans"/>
+                <a:cs typeface="Google Sans"/>
+                <a:sym typeface="Google Sans"/>
+              </a:rPr>
+              <a:t>Prompt generation function</a:t>
+            </a:r>
+          </a:p>
+          <a:p>
+            <a:pPr marL="342900" indent="-342900">
+              <a:spcAft>
+                <a:spcPts val="600"/>
+              </a:spcAft>
+              <a:buClrTx/>
+              <a:buSzPct val="100000"/>
+              <a:buFont typeface="+mj-lt"/>
+              <a:buAutoNum type="arabicPeriod"/>
+            </a:pPr>
+            <a:r>
+              <a:rPr lang="en-US" sz="1500" dirty="0">
+                <a:solidFill>
+                  <a:schemeClr val="tx1"/>
+                </a:solidFill>
+                <a:latin typeface="Google Sans"/>
+                <a:ea typeface="Google Sans"/>
+                <a:cs typeface="Google Sans"/>
+                <a:sym typeface="Google Sans"/>
+              </a:rPr>
+              <a:t>Main RAG function</a:t>
+            </a:r>
+          </a:p>
+          <a:p>
+            <a:pPr marL="342900" indent="-342900">
+              <a:spcAft>
+                <a:spcPts val="600"/>
+              </a:spcAft>
+              <a:buClrTx/>
+              <a:buSzPct val="100000"/>
+              <a:buFont typeface="+mj-lt"/>
+              <a:buAutoNum type="arabicPeriod"/>
+            </a:pPr>
+            <a:r>
+              <a:rPr lang="en-US" sz="1500" dirty="0">
+                <a:solidFill>
+                  <a:schemeClr val="tx1"/>
+                </a:solidFill>
+                <a:latin typeface="Google Sans"/>
+                <a:ea typeface="Google Sans"/>
+                <a:cs typeface="Google Sans"/>
+                <a:sym typeface="Google Sans"/>
+              </a:rPr>
+              <a:t>Use a basic UI for chat</a:t>
+            </a:r>
+          </a:p>
+          <a:p>
+            <a:pPr marL="342900" indent="-342900">
+              <a:spcAft>
+                <a:spcPts val="600"/>
+              </a:spcAft>
+              <a:buClrTx/>
+              <a:buSzPct val="100000"/>
+              <a:buFont typeface="+mj-lt"/>
+              <a:buAutoNum type="arabicPeriod"/>
+            </a:pPr>
+            <a:endParaRPr lang="en-US" sz="1500" dirty="0">
+              <a:solidFill>
+                <a:schemeClr val="tx1"/>
+              </a:solidFill>
+              <a:latin typeface="Google Sans"/>
+              <a:ea typeface="Google Sans"/>
+              <a:cs typeface="Google Sans"/>
+              <a:sym typeface="Google Sans"/>
+            </a:endParaRPr>
+          </a:p>
+        </p:txBody>
+      </p:sp>
+    </p:spTree>
+    <p:extLst>
+      <p:ext uri="{BB962C8B-B14F-4D97-AF65-F5344CB8AC3E}">
+        <p14:creationId xmlns:p14="http://schemas.microsoft.com/office/powerpoint/2010/main" val="30238597"/>
       </p:ext>
     </p:extLst>
   </p:cSld>
@@ -11993,55 +11806,8 @@
         </p:blipFill>
         <p:spPr bwMode="auto">
           <a:xfrm>
-            <a:off x="1552856" y="3116646"/>
+            <a:off x="1162158" y="3357715"/>
             <a:ext cx="401783" cy="401783"/>
-          </a:xfrm>
-          <a:prstGeom prst="rect">
-            <a:avLst/>
-          </a:prstGeom>
-          <a:noFill/>
-          <a:extLst>
-            <a:ext uri="{909E8E84-426E-40DD-AFC4-6F175D3DCCD1}">
-              <a14:hiddenFill xmlns:a14="http://schemas.microsoft.com/office/drawing/2010/main">
-                <a:solidFill>
-                  <a:srgbClr val="FFFFFF"/>
-                </a:solidFill>
-              </a14:hiddenFill>
-            </a:ext>
-          </a:extLst>
-        </p:spPr>
-      </p:pic>
-      <p:pic>
-        <p:nvPicPr>
-          <p:cNvPr id="2050" name="Picture 2">
-            <a:extLst>
-              <a:ext uri="{FF2B5EF4-FFF2-40B4-BE49-F238E27FC236}">
-                <a16:creationId xmlns:a16="http://schemas.microsoft.com/office/drawing/2014/main" id="{B309AA9F-AACB-EC92-28C7-5584ED6B3F41}"/>
-              </a:ext>
-            </a:extLst>
-          </p:cNvPr>
-          <p:cNvPicPr>
-            <a:picLocks noChangeAspect="1" noChangeArrowheads="1"/>
-          </p:cNvPicPr>
-          <p:nvPr/>
-        </p:nvPicPr>
-        <p:blipFill>
-          <a:blip r:embed="rId4">
-            <a:extLst>
-              <a:ext uri="{28A0092B-C50C-407E-A947-70E740481C1C}">
-                <a14:useLocalDpi xmlns:a14="http://schemas.microsoft.com/office/drawing/2010/main" val="0"/>
-              </a:ext>
-            </a:extLst>
-          </a:blip>
-          <a:srcRect/>
-          <a:stretch>
-            <a:fillRect/>
-          </a:stretch>
-        </p:blipFill>
-        <p:spPr bwMode="auto">
-          <a:xfrm>
-            <a:off x="1570085" y="4154137"/>
-            <a:ext cx="393138" cy="393138"/>
           </a:xfrm>
           <a:prstGeom prst="rect">
             <a:avLst/>
@@ -12072,8 +11838,8 @@
         </p:nvSpPr>
         <p:spPr>
           <a:xfrm>
-            <a:off x="2066691" y="3163648"/>
-            <a:ext cx="3895493" cy="307777"/>
+            <a:off x="1675992" y="3351609"/>
+            <a:ext cx="2122923" cy="523220"/>
           </a:xfrm>
           <a:prstGeom prst="rect">
             <a:avLst/>
@@ -12111,8 +11877,8 @@
         </p:nvSpPr>
         <p:spPr>
           <a:xfrm>
-            <a:off x="2066690" y="3710476"/>
-            <a:ext cx="3895493" cy="307777"/>
+            <a:off x="1675992" y="3874829"/>
+            <a:ext cx="2203280" cy="307777"/>
           </a:xfrm>
           <a:prstGeom prst="rect">
             <a:avLst/>
@@ -12132,61 +11898,6 @@
                 </a:solidFill>
               </a:rPr>
               <a:t>https://github.com/ro1406</a:t>
-            </a:r>
-          </a:p>
-        </p:txBody>
-      </p:sp>
-      <p:sp>
-        <p:nvSpPr>
-          <p:cNvPr id="8" name="TextBox 7">
-            <a:extLst>
-              <a:ext uri="{FF2B5EF4-FFF2-40B4-BE49-F238E27FC236}">
-                <a16:creationId xmlns:a16="http://schemas.microsoft.com/office/drawing/2014/main" id="{90945509-7DE2-1376-FB35-B4C5C6B574ED}"/>
-              </a:ext>
-            </a:extLst>
-          </p:cNvPr>
-          <p:cNvSpPr txBox="1"/>
-          <p:nvPr/>
-        </p:nvSpPr>
-        <p:spPr>
-          <a:xfrm>
-            <a:off x="2066690" y="4196817"/>
-            <a:ext cx="4661212" cy="307777"/>
-          </a:xfrm>
-          <a:prstGeom prst="rect">
-            <a:avLst/>
-          </a:prstGeom>
-          <a:noFill/>
-        </p:spPr>
-        <p:txBody>
-          <a:bodyPr wrap="square" rtlCol="0">
-            <a:spAutoFit/>
-          </a:bodyPr>
-          <a:lstStyle/>
-          <a:p>
-            <a:r>
-              <a:rPr lang="en-US" dirty="0">
-                <a:solidFill>
-                  <a:schemeClr val="tx1"/>
-                </a:solidFill>
-              </a:rPr>
-              <a:t>scholar.google.com/</a:t>
-            </a:r>
-            <a:r>
-              <a:rPr lang="en-US" dirty="0" err="1">
-                <a:solidFill>
-                  <a:schemeClr val="tx1"/>
-                </a:solidFill>
-              </a:rPr>
-              <a:t>citations?user</a:t>
-            </a:r>
-            <a:r>
-              <a:rPr lang="en-US" dirty="0">
-                <a:solidFill>
-                  <a:schemeClr val="tx1"/>
-                </a:solidFill>
-              </a:rPr>
-              <a:t>=Jh0DuX4AAAAJ</a:t>
             </a:r>
           </a:p>
         </p:txBody>
@@ -12206,7 +11917,7 @@
           <p:nvPr/>
         </p:nvPicPr>
         <p:blipFill rotWithShape="1">
-          <a:blip r:embed="rId5">
+          <a:blip r:embed="rId4">
             <a:extLst>
               <a:ext uri="{28A0092B-C50C-407E-A947-70E740481C1C}">
                 <a14:useLocalDpi xmlns:a14="http://schemas.microsoft.com/office/drawing/2010/main" val="0"/>
@@ -12218,7 +11929,7 @@
         </p:blipFill>
         <p:spPr bwMode="auto">
           <a:xfrm>
-            <a:off x="1536995" y="3633760"/>
+            <a:off x="1146297" y="3874829"/>
             <a:ext cx="417644" cy="393138"/>
           </a:xfrm>
           <a:prstGeom prst="rect">
@@ -12234,6 +11945,206 @@
               </a14:hiddenFill>
             </a:ext>
           </a:extLst>
+        </p:spPr>
+      </p:pic>
+      <p:pic>
+        <p:nvPicPr>
+          <p:cNvPr id="3" name="Picture 2" descr="Linkedin icon - Free download on Iconfinder">
+            <a:extLst>
+              <a:ext uri="{FF2B5EF4-FFF2-40B4-BE49-F238E27FC236}">
+                <a16:creationId xmlns:a16="http://schemas.microsoft.com/office/drawing/2014/main" id="{C6E2FAFA-660A-36C9-321B-E85CB6364459}"/>
+              </a:ext>
+            </a:extLst>
+          </p:cNvPr>
+          <p:cNvPicPr>
+            <a:picLocks noChangeAspect="1" noChangeArrowheads="1"/>
+          </p:cNvPicPr>
+          <p:nvPr/>
+        </p:nvPicPr>
+        <p:blipFill>
+          <a:blip r:embed="rId3">
+            <a:extLst>
+              <a:ext uri="{28A0092B-C50C-407E-A947-70E740481C1C}">
+                <a14:useLocalDpi xmlns:a14="http://schemas.microsoft.com/office/drawing/2010/main" val="0"/>
+              </a:ext>
+            </a:extLst>
+          </a:blip>
+          <a:srcRect/>
+          <a:stretch>
+            <a:fillRect/>
+          </a:stretch>
+        </p:blipFill>
+        <p:spPr bwMode="auto">
+          <a:xfrm>
+            <a:off x="4406893" y="3357715"/>
+            <a:ext cx="401783" cy="401783"/>
+          </a:xfrm>
+          <a:prstGeom prst="rect">
+            <a:avLst/>
+          </a:prstGeom>
+          <a:noFill/>
+          <a:extLst>
+            <a:ext uri="{909E8E84-426E-40DD-AFC4-6F175D3DCCD1}">
+              <a14:hiddenFill xmlns:a14="http://schemas.microsoft.com/office/drawing/2010/main">
+                <a:solidFill>
+                  <a:srgbClr val="FFFFFF"/>
+                </a:solidFill>
+              </a14:hiddenFill>
+            </a:ext>
+          </a:extLst>
+        </p:spPr>
+      </p:pic>
+      <p:sp>
+        <p:nvSpPr>
+          <p:cNvPr id="4" name="TextBox 3">
+            <a:extLst>
+              <a:ext uri="{FF2B5EF4-FFF2-40B4-BE49-F238E27FC236}">
+                <a16:creationId xmlns:a16="http://schemas.microsoft.com/office/drawing/2014/main" id="{DB1A6B3C-379C-5BFA-6239-471478B93EFB}"/>
+              </a:ext>
+            </a:extLst>
+          </p:cNvPr>
+          <p:cNvSpPr txBox="1"/>
+          <p:nvPr/>
+        </p:nvSpPr>
+        <p:spPr>
+          <a:xfrm>
+            <a:off x="4873958" y="3347316"/>
+            <a:ext cx="2122923" cy="523220"/>
+          </a:xfrm>
+          <a:prstGeom prst="rect">
+            <a:avLst/>
+          </a:prstGeom>
+          <a:noFill/>
+        </p:spPr>
+        <p:txBody>
+          <a:bodyPr wrap="square" rtlCol="0">
+            <a:spAutoFit/>
+          </a:bodyPr>
+          <a:lstStyle/>
+          <a:p>
+            <a:r>
+              <a:rPr lang="en-US" dirty="0">
+                <a:solidFill>
+                  <a:schemeClr val="tx1"/>
+                </a:solidFill>
+              </a:rPr>
+              <a:t>https://www.linkedin.com/in/ogouda/</a:t>
+            </a:r>
+          </a:p>
+        </p:txBody>
+      </p:sp>
+      <p:sp>
+        <p:nvSpPr>
+          <p:cNvPr id="7" name="TextBox 6">
+            <a:extLst>
+              <a:ext uri="{FF2B5EF4-FFF2-40B4-BE49-F238E27FC236}">
+                <a16:creationId xmlns:a16="http://schemas.microsoft.com/office/drawing/2014/main" id="{33A21E2B-91B8-4F5D-69FF-C317C9951E49}"/>
+              </a:ext>
+            </a:extLst>
+          </p:cNvPr>
+          <p:cNvSpPr txBox="1"/>
+          <p:nvPr/>
+        </p:nvSpPr>
+        <p:spPr>
+          <a:xfrm>
+            <a:off x="4873958" y="3874829"/>
+            <a:ext cx="2315331" cy="307777"/>
+          </a:xfrm>
+          <a:prstGeom prst="rect">
+            <a:avLst/>
+          </a:prstGeom>
+          <a:noFill/>
+        </p:spPr>
+        <p:txBody>
+          <a:bodyPr wrap="square" rtlCol="0">
+            <a:spAutoFit/>
+          </a:bodyPr>
+          <a:lstStyle/>
+          <a:p>
+            <a:r>
+              <a:rPr lang="en-US" dirty="0">
+                <a:solidFill>
+                  <a:schemeClr val="tx1"/>
+                </a:solidFill>
+              </a:rPr>
+              <a:t>https://github.com/ogouda</a:t>
+            </a:r>
+          </a:p>
+        </p:txBody>
+      </p:sp>
+      <p:pic>
+        <p:nvPicPr>
+          <p:cNvPr id="9" name="Picture 4">
+            <a:extLst>
+              <a:ext uri="{FF2B5EF4-FFF2-40B4-BE49-F238E27FC236}">
+                <a16:creationId xmlns:a16="http://schemas.microsoft.com/office/drawing/2014/main" id="{E7DC373C-FD8E-0FB0-8016-98A9483998D5}"/>
+              </a:ext>
+            </a:extLst>
+          </p:cNvPr>
+          <p:cNvPicPr>
+            <a:picLocks noChangeAspect="1" noChangeArrowheads="1"/>
+          </p:cNvPicPr>
+          <p:nvPr/>
+        </p:nvPicPr>
+        <p:blipFill rotWithShape="1">
+          <a:blip r:embed="rId4">
+            <a:extLst>
+              <a:ext uri="{28A0092B-C50C-407E-A947-70E740481C1C}">
+                <a14:useLocalDpi xmlns:a14="http://schemas.microsoft.com/office/drawing/2010/main" val="0"/>
+              </a:ext>
+            </a:extLst>
+          </a:blip>
+          <a:srcRect l="29638" r="30805" b="33802"/>
+          <a:stretch/>
+        </p:blipFill>
+        <p:spPr bwMode="auto">
+          <a:xfrm>
+            <a:off x="4391032" y="3874829"/>
+            <a:ext cx="417644" cy="393138"/>
+          </a:xfrm>
+          <a:prstGeom prst="rect">
+            <a:avLst/>
+          </a:prstGeom>
+          <a:noFill/>
+          <a:extLst>
+            <a:ext uri="{909E8E84-426E-40DD-AFC4-6F175D3DCCD1}">
+              <a14:hiddenFill xmlns:a14="http://schemas.microsoft.com/office/drawing/2010/main">
+                <a:solidFill>
+                  <a:srgbClr val="FFFFFF"/>
+                </a:solidFill>
+              </a14:hiddenFill>
+            </a:ext>
+          </a:extLst>
+        </p:spPr>
+      </p:pic>
+      <p:pic>
+        <p:nvPicPr>
+          <p:cNvPr id="10" name="Picture 9">
+            <a:extLst>
+              <a:ext uri="{FF2B5EF4-FFF2-40B4-BE49-F238E27FC236}">
+                <a16:creationId xmlns:a16="http://schemas.microsoft.com/office/drawing/2014/main" id="{4F8C48C1-C533-CC56-90E9-3A24FA3B9CB6}"/>
+              </a:ext>
+            </a:extLst>
+          </p:cNvPr>
+          <p:cNvPicPr>
+            <a:picLocks noChangeAspect="1"/>
+          </p:cNvPicPr>
+          <p:nvPr/>
+        </p:nvPicPr>
+        <p:blipFill>
+          <a:blip r:embed="rId5"/>
+          <a:stretch>
+            <a:fillRect/>
+          </a:stretch>
+        </p:blipFill>
+        <p:spPr>
+          <a:xfrm>
+            <a:off x="6325985" y="162062"/>
+            <a:ext cx="2518757" cy="1138510"/>
+          </a:xfrm>
+          <a:prstGeom prst="rect">
+            <a:avLst/>
+          </a:prstGeom>
         </p:spPr>
       </p:pic>
     </p:spTree>
@@ -13484,7 +13395,7 @@
                 <a:cs typeface="Google Sans"/>
                 <a:sym typeface="Google Sans"/>
               </a:rPr>
-              <a:t>You work for G-Electronics – an electronics seller</a:t>
+              <a:t>You work for Cymbal Bikes – a bike mechanics shop</a:t>
             </a:r>
           </a:p>
           <a:p>
@@ -13498,7 +13409,15 @@
               <a:buChar char="•"/>
             </a:pPr>
             <a:r>
-              <a:rPr lang="en" sz="1800" dirty="0">
+              <a:rPr lang="en-US" sz="1800" dirty="0">
+                <a:solidFill>
+                  <a:schemeClr val="tx1"/>
+                </a:solidFill>
+              </a:rPr>
+              <a:t>O</a:t>
+            </a:r>
+            <a:r>
+              <a:rPr lang="en-US" sz="1800" dirty="0">
                 <a:solidFill>
                   <a:schemeClr val="tx1"/>
                 </a:solidFill>
@@ -13507,11 +13426,32 @@
                 <a:cs typeface="Google Sans"/>
                 <a:sym typeface="Google Sans"/>
               </a:rPr>
-              <a:t>Sells TVs, Phones, Home Applicances, etc</a:t>
-            </a:r>
-          </a:p>
-          <a:p>
-            <a:pPr marL="285750" indent="-285750">
+              <a:t>ffers services like brake repair, chain replacement, </a:t>
+            </a:r>
+            <a:r>
+              <a:rPr lang="en-US" sz="1800" dirty="0" err="1">
+                <a:solidFill>
+                  <a:schemeClr val="tx1"/>
+                </a:solidFill>
+                <a:latin typeface="Google Sans"/>
+                <a:ea typeface="Google Sans"/>
+                <a:cs typeface="Google Sans"/>
+                <a:sym typeface="Google Sans"/>
+              </a:rPr>
+              <a:t>etc</a:t>
+            </a:r>
+            <a:endParaRPr lang="en-US" sz="1800" dirty="0">
+              <a:solidFill>
+                <a:schemeClr val="tx1"/>
+              </a:solidFill>
+              <a:latin typeface="Google Sans"/>
+              <a:ea typeface="Google Sans"/>
+              <a:cs typeface="Google Sans"/>
+              <a:sym typeface="Google Sans"/>
+            </a:endParaRPr>
+          </a:p>
+          <a:p>
+            <a:pPr marL="742950" lvl="1" indent="-285750">
               <a:spcAft>
                 <a:spcPts val="1200"/>
               </a:spcAft>
@@ -13787,8 +13727,25 @@
                   <a:schemeClr val="tx1"/>
                 </a:solidFill>
               </a:rPr>
-              <a:t>Document Fetcher</a:t>
-            </a:r>
+              <a:t>Document </a:t>
+            </a:r>
+            <a:r>
+              <a:rPr lang="en" sz="1400" dirty="0">
+                <a:solidFill>
+                  <a:srgbClr val="1E1E1E"/>
+                </a:solidFill>
+                <a:latin typeface="Google Sans"/>
+                <a:ea typeface="Google Sans"/>
+                <a:cs typeface="Google Sans"/>
+                <a:sym typeface="Google Sans"/>
+              </a:rPr>
+              <a:t>Retriever</a:t>
+            </a:r>
+            <a:endParaRPr lang="en-US" dirty="0">
+              <a:solidFill>
+                <a:schemeClr val="tx1"/>
+              </a:solidFill>
+            </a:endParaRPr>
           </a:p>
         </p:txBody>
       </p:sp>
@@ -14414,7 +14371,7 @@
             </a:pPr>
             <a:r>
               <a:rPr lang="en-US" sz="1800" dirty="0"/>
-              <a:t>App has some preprocessing and moderation to question</a:t>
+              <a:t>App has some preprocessing (and moderation) to question</a:t>
             </a:r>
           </a:p>
           <a:p>
@@ -14448,11 +14405,11 @@
             </a:pPr>
             <a:r>
               <a:rPr lang="en-US" sz="1800" u="sng" dirty="0"/>
-              <a:t>G-Electronics</a:t>
+              <a:t>Cymbal Bikes</a:t>
             </a:r>
             <a:r>
               <a:rPr lang="en-US" sz="1800" dirty="0"/>
-              <a:t>: “I want a smart TV 70 inch Samsung with Android OS. Show me cheapest options”</a:t>
+              <a:t>: “How much does it cost to repair a gear and what all does it include, at Cymbal Bikes?”</a:t>
             </a:r>
           </a:p>
         </p:txBody>
@@ -14649,8 +14606,25 @@
                   <a:schemeClr val="tx1"/>
                 </a:solidFill>
               </a:rPr>
-              <a:t>Document Fetcher</a:t>
-            </a:r>
+              <a:t>Document </a:t>
+            </a:r>
+            <a:r>
+              <a:rPr lang="en" sz="1400" dirty="0">
+                <a:solidFill>
+                  <a:srgbClr val="1E1E1E"/>
+                </a:solidFill>
+                <a:latin typeface="Google Sans"/>
+                <a:ea typeface="Google Sans"/>
+                <a:cs typeface="Google Sans"/>
+                <a:sym typeface="Google Sans"/>
+              </a:rPr>
+              <a:t>Retriever</a:t>
+            </a:r>
+            <a:endParaRPr lang="en-US" dirty="0">
+              <a:solidFill>
+                <a:schemeClr val="tx1"/>
+              </a:solidFill>
+            </a:endParaRPr>
           </a:p>
         </p:txBody>
       </p:sp>
@@ -15327,7 +15301,7 @@
                 <a:cs typeface="Google Sans"/>
                 <a:sym typeface="Google Sans"/>
               </a:rPr>
-              <a:t>Document Fetcher</a:t>
+              <a:t>Document Retriever</a:t>
             </a:r>
             <a:endParaRPr dirty="0">
               <a:solidFill>
@@ -15394,18 +15368,7 @@
               </a:rPr>
               <a:t>Identify documents with possibly relevant info</a:t>
             </a:r>
-          </a:p>
-          <a:p>
-            <a:pPr marL="285750" indent="-285750">
-              <a:spcAft>
-                <a:spcPts val="1200"/>
-              </a:spcAft>
-              <a:buClrTx/>
-              <a:buSzPct val="140000"/>
-              <a:buFont typeface="Arial" panose="020B0604020202020204" pitchFamily="34" charset="0"/>
-              <a:buChar char="•"/>
-            </a:pPr>
-            <a:r>
+            <a:br>
               <a:rPr lang="en" sz="1500" dirty="0">
                 <a:solidFill>
                   <a:schemeClr val="tx1"/>
@@ -15415,147 +15378,8 @@
                 <a:cs typeface="Google Sans"/>
                 <a:sym typeface="Google Sans"/>
               </a:rPr>
-              <a:t>Create VectorDB</a:t>
-            </a:r>
-          </a:p>
-          <a:p>
-            <a:pPr marL="742950" lvl="1" indent="-285750">
-              <a:spcAft>
-                <a:spcPts val="1200"/>
-              </a:spcAft>
-              <a:buClrTx/>
-              <a:buSzPct val="140000"/>
-              <a:buFont typeface="Arial" panose="020B0604020202020204" pitchFamily="34" charset="0"/>
-              <a:buChar char="•"/>
-            </a:pPr>
-            <a:r>
-              <a:rPr lang="en" sz="1500" dirty="0">
-                <a:solidFill>
-                  <a:schemeClr val="tx1"/>
-                </a:solidFill>
-                <a:latin typeface="Google Sans"/>
-                <a:ea typeface="Google Sans"/>
-                <a:cs typeface="Google Sans"/>
-                <a:sym typeface="Google Sans"/>
-              </a:rPr>
-              <a:t>Chunk documents, embed the text, and store meta-data to allow filtering</a:t>
-            </a:r>
-          </a:p>
-          <a:p>
-            <a:pPr marL="742950" lvl="1" indent="-285750">
-              <a:spcAft>
-                <a:spcPts val="1200"/>
-              </a:spcAft>
-              <a:buClrTx/>
-              <a:buSzPct val="140000"/>
-              <a:buFont typeface="Arial" panose="020B0604020202020204" pitchFamily="34" charset="0"/>
-              <a:buChar char="•"/>
-            </a:pPr>
-            <a:r>
-              <a:rPr lang="en" sz="1500" dirty="0">
-                <a:solidFill>
-                  <a:schemeClr val="tx1"/>
-                </a:solidFill>
-                <a:latin typeface="Google Sans"/>
-                <a:ea typeface="Google Sans"/>
-                <a:cs typeface="Google Sans"/>
-                <a:sym typeface="Google Sans"/>
-              </a:rPr>
-              <a:t>Group similar documents into indicies </a:t>
-            </a:r>
-            <a:r>
-              <a:rPr lang="en" sz="1500" dirty="0">
-                <a:solidFill>
-                  <a:schemeClr val="tx1"/>
-                </a:solidFill>
-              </a:rPr>
-              <a:t>or partitions</a:t>
-            </a:r>
-          </a:p>
-          <a:p>
-            <a:pPr marL="742950" lvl="1" indent="-285750">
-              <a:spcAft>
-                <a:spcPts val="1200"/>
-              </a:spcAft>
-              <a:buClrTx/>
-              <a:buSzPct val="140000"/>
-              <a:buFont typeface="Arial" panose="020B0604020202020204" pitchFamily="34" charset="0"/>
-              <a:buChar char="•"/>
-            </a:pPr>
-            <a:r>
-              <a:rPr lang="en" sz="1500" dirty="0">
-                <a:solidFill>
-                  <a:schemeClr val="tx1"/>
-                </a:solidFill>
-              </a:rPr>
-              <a:t>Eg: Elastic Search, Pinecone, Marqo, Qdrant</a:t>
-            </a:r>
-          </a:p>
-          <a:p>
-            <a:pPr marL="285750" indent="-285750">
-              <a:spcAft>
-                <a:spcPts val="1200"/>
-              </a:spcAft>
-              <a:buClrTx/>
-              <a:buSzPct val="140000"/>
-              <a:buFont typeface="Arial" panose="020B0604020202020204" pitchFamily="34" charset="0"/>
-              <a:buChar char="•"/>
-            </a:pPr>
-            <a:r>
-              <a:rPr lang="en-US" sz="1500" dirty="0">
-                <a:solidFill>
-                  <a:schemeClr val="tx1"/>
-                </a:solidFill>
-                <a:latin typeface="Google Sans"/>
-                <a:ea typeface="Google Sans"/>
-                <a:cs typeface="Google Sans"/>
-                <a:sym typeface="Google Sans"/>
-              </a:rPr>
-              <a:t>Query DB using user intent (embedding) + filters</a:t>
-            </a:r>
-          </a:p>
-          <a:p>
-            <a:pPr marL="285750" indent="-285750">
-              <a:spcAft>
-                <a:spcPts val="1200"/>
-              </a:spcAft>
-              <a:buClrTx/>
-              <a:buSzPct val="140000"/>
-              <a:buFont typeface="Arial" panose="020B0604020202020204" pitchFamily="34" charset="0"/>
-              <a:buChar char="•"/>
-            </a:pPr>
-            <a:r>
-              <a:rPr lang="en-US" sz="1500" dirty="0">
-                <a:solidFill>
-                  <a:schemeClr val="tx1"/>
-                </a:solidFill>
-                <a:latin typeface="Google Sans"/>
-                <a:ea typeface="Google Sans"/>
-                <a:cs typeface="Google Sans"/>
-                <a:sym typeface="Google Sans"/>
-              </a:rPr>
-              <a:t>Retrieval models/engines</a:t>
-            </a:r>
-          </a:p>
-          <a:p>
-            <a:pPr marL="742950" lvl="1" indent="-285750">
-              <a:spcAft>
-                <a:spcPts val="1200"/>
-              </a:spcAft>
-              <a:buClrTx/>
-              <a:buSzPct val="140000"/>
-              <a:buFont typeface="Arial" panose="020B0604020202020204" pitchFamily="34" charset="0"/>
-              <a:buChar char="•"/>
-            </a:pPr>
-            <a:r>
-              <a:rPr lang="en-US" sz="1500" dirty="0">
-                <a:solidFill>
-                  <a:schemeClr val="tx1"/>
-                </a:solidFill>
-              </a:rPr>
-              <a:t>FAISS, Lucene, Dense Passage Retrieval</a:t>
-            </a:r>
-            <a:endParaRPr lang="en-US" sz="1500" dirty="0">
+            </a:br>
+            <a:endParaRPr lang="en" sz="1500" dirty="0">
               <a:solidFill>
                 <a:schemeClr val="tx1"/>
               </a:solidFill>
@@ -15564,6 +15388,137 @@
               <a:cs typeface="Google Sans"/>
               <a:sym typeface="Google Sans"/>
             </a:endParaRPr>
+          </a:p>
+          <a:p>
+            <a:pPr marL="285750" indent="-285750">
+              <a:spcAft>
+                <a:spcPts val="1200"/>
+              </a:spcAft>
+              <a:buClrTx/>
+              <a:buSzPct val="140000"/>
+              <a:buFont typeface="Arial" panose="020B0604020202020204" pitchFamily="34" charset="0"/>
+              <a:buChar char="•"/>
+            </a:pPr>
+            <a:r>
+              <a:rPr lang="en" sz="1500" dirty="0">
+                <a:solidFill>
+                  <a:schemeClr val="tx1"/>
+                </a:solidFill>
+                <a:latin typeface="Google Sans"/>
+                <a:ea typeface="Google Sans"/>
+                <a:cs typeface="Google Sans"/>
+                <a:sym typeface="Google Sans"/>
+              </a:rPr>
+              <a:t>Create VectorDB</a:t>
+            </a:r>
+          </a:p>
+          <a:p>
+            <a:pPr marL="742950" lvl="1" indent="-285750">
+              <a:spcAft>
+                <a:spcPts val="1200"/>
+              </a:spcAft>
+              <a:buClrTx/>
+              <a:buSzPct val="140000"/>
+              <a:buFont typeface="Arial" panose="020B0604020202020204" pitchFamily="34" charset="0"/>
+              <a:buChar char="•"/>
+            </a:pPr>
+            <a:r>
+              <a:rPr lang="en" sz="1500" dirty="0">
+                <a:solidFill>
+                  <a:schemeClr val="tx1"/>
+                </a:solidFill>
+                <a:latin typeface="Google Sans"/>
+                <a:ea typeface="Google Sans"/>
+                <a:cs typeface="Google Sans"/>
+                <a:sym typeface="Google Sans"/>
+              </a:rPr>
+              <a:t>Chunk documents, embed the text, and store meta-data to allow filtering</a:t>
+            </a:r>
+          </a:p>
+          <a:p>
+            <a:pPr marL="742950" lvl="1" indent="-285750">
+              <a:spcAft>
+                <a:spcPts val="1200"/>
+              </a:spcAft>
+              <a:buClrTx/>
+              <a:buSzPct val="140000"/>
+              <a:buFont typeface="Arial" panose="020B0604020202020204" pitchFamily="34" charset="0"/>
+              <a:buChar char="•"/>
+            </a:pPr>
+            <a:r>
+              <a:rPr lang="en" sz="1500" dirty="0">
+                <a:solidFill>
+                  <a:schemeClr val="tx1"/>
+                </a:solidFill>
+                <a:latin typeface="Google Sans"/>
+                <a:ea typeface="Google Sans"/>
+                <a:cs typeface="Google Sans"/>
+                <a:sym typeface="Google Sans"/>
+              </a:rPr>
+              <a:t>Group similar documents into indicies </a:t>
+            </a:r>
+            <a:r>
+              <a:rPr lang="en" sz="1500" dirty="0">
+                <a:solidFill>
+                  <a:schemeClr val="tx1"/>
+                </a:solidFill>
+              </a:rPr>
+              <a:t>or partitions</a:t>
+            </a:r>
+          </a:p>
+          <a:p>
+            <a:pPr marL="742950" lvl="1" indent="-285750">
+              <a:spcAft>
+                <a:spcPts val="1200"/>
+              </a:spcAft>
+              <a:buClrTx/>
+              <a:buSzPct val="140000"/>
+              <a:buFont typeface="Arial" panose="020B0604020202020204" pitchFamily="34" charset="0"/>
+              <a:buChar char="•"/>
+            </a:pPr>
+            <a:r>
+              <a:rPr lang="en" sz="1500" dirty="0">
+                <a:solidFill>
+                  <a:schemeClr val="tx1"/>
+                </a:solidFill>
+              </a:rPr>
+              <a:t>Eg: Elastic Search, Pinecone, Marqo, Qdrant</a:t>
+            </a:r>
+            <a:br>
+              <a:rPr lang="en" sz="1500" dirty="0">
+                <a:solidFill>
+                  <a:schemeClr val="tx1"/>
+                </a:solidFill>
+              </a:rPr>
+            </a:br>
+            <a:endParaRPr lang="en" sz="1500" dirty="0">
+              <a:solidFill>
+                <a:schemeClr val="tx1"/>
+              </a:solidFill>
+            </a:endParaRPr>
+          </a:p>
+          <a:p>
+            <a:pPr marL="285750" indent="-285750">
+              <a:spcAft>
+                <a:spcPts val="1200"/>
+              </a:spcAft>
+              <a:buClrTx/>
+              <a:buSzPct val="140000"/>
+              <a:buFont typeface="Arial" panose="020B0604020202020204" pitchFamily="34" charset="0"/>
+              <a:buChar char="•"/>
+            </a:pPr>
+            <a:r>
+              <a:rPr lang="en-US" sz="1500" dirty="0">
+                <a:solidFill>
+                  <a:schemeClr val="tx1"/>
+                </a:solidFill>
+                <a:latin typeface="Google Sans"/>
+                <a:ea typeface="Google Sans"/>
+                <a:cs typeface="Google Sans"/>
+                <a:sym typeface="Google Sans"/>
+              </a:rPr>
+              <a:t>Query DB using user intent (embedding) + filters (if any)</a:t>
+            </a:r>
           </a:p>
         </p:txBody>
       </p:sp>
@@ -15838,7 +15793,31 @@
                 <a:cs typeface="Google Sans"/>
                 <a:sym typeface="Google Sans"/>
               </a:rPr>
-              <a:t>Document Fetcher: G-Electronics</a:t>
+              <a:t>Document </a:t>
+            </a:r>
+            <a:r>
+              <a:rPr lang="en" sz="2500" dirty="0">
+                <a:solidFill>
+                  <a:srgbClr val="1E1E1E"/>
+                </a:solidFill>
+                <a:latin typeface="Google Sans"/>
+                <a:ea typeface="Google Sans"/>
+                <a:cs typeface="Google Sans"/>
+                <a:sym typeface="Google Sans"/>
+              </a:rPr>
+              <a:t>Retriever</a:t>
+            </a:r>
+            <a:r>
+              <a:rPr lang="en-US" sz="2500" dirty="0">
+                <a:solidFill>
+                  <a:srgbClr val="1E1E1E"/>
+                </a:solidFill>
+                <a:latin typeface="Google Sans"/>
+                <a:ea typeface="Google Sans"/>
+                <a:cs typeface="Google Sans"/>
+                <a:sym typeface="Google Sans"/>
+              </a:rPr>
+              <a:t>: G-Electronics</a:t>
             </a:r>
             <a:endParaRPr lang="en-US" dirty="0">
               <a:solidFill>
@@ -15903,7 +15882,7 @@
                 <a:cs typeface="Google Sans"/>
                 <a:sym typeface="Google Sans"/>
               </a:rPr>
-              <a:t>Store each item’s listing in a database / index</a:t>
+              <a:t>Store each relevant document in an index</a:t>
             </a:r>
           </a:p>
           <a:p>
@@ -15926,7 +15905,7 @@
                 <a:cs typeface="Google Sans"/>
                 <a:sym typeface="Google Sans"/>
               </a:rPr>
-              <a:t>Can have different indices for different types of products</a:t>
+              <a:t>Can have different indices for different types of information</a:t>
             </a:r>
           </a:p>
           <a:p>
@@ -15945,8 +15924,21 @@
                   <a:schemeClr val="tx1"/>
                 </a:solidFill>
               </a:rPr>
-              <a:t>TV, Mobile phone, Home appliances, latest products, can all have their own indices</a:t>
-            </a:r>
+              <a:t>Service costing index, store policies index, FAQ index, </a:t>
+            </a:r>
+            <a:r>
+              <a:rPr lang="en-US" sz="1500" dirty="0" err="1">
+                <a:solidFill>
+                  <a:schemeClr val="tx1"/>
+                </a:solidFill>
+              </a:rPr>
+              <a:t>etc</a:t>
+            </a:r>
+            <a:endParaRPr lang="en-US" sz="1500" dirty="0">
+              <a:solidFill>
+                <a:schemeClr val="tx1"/>
+              </a:solidFill>
+            </a:endParaRPr>
           </a:p>
           <a:p>
             <a:pPr marL="285750" indent="-285750">
@@ -15989,29 +15981,7 @@
                 <a:ea typeface="Google Sans"/>
                 <a:cs typeface="Google Sans"/>
               </a:rPr>
-              <a:t>Meta-data about each item (size, price, color, brand, </a:t>
-            </a:r>
-            <a:r>
-              <a:rPr lang="en-US" sz="1500" dirty="0" err="1">
-                <a:solidFill>
-                  <a:schemeClr val="tx1"/>
-                </a:solidFill>
-                <a:latin typeface="Google Sans"/>
-                <a:ea typeface="Google Sans"/>
-                <a:cs typeface="Google Sans"/>
-              </a:rPr>
-              <a:t>etc</a:t>
-            </a:r>
-            <a:r>
-              <a:rPr lang="en-US" sz="1500" dirty="0">
-                <a:solidFill>
-                  <a:schemeClr val="tx1"/>
-                </a:solidFill>
-                <a:latin typeface="Google Sans"/>
-                <a:ea typeface="Google Sans"/>
-                <a:cs typeface="Google Sans"/>
-              </a:rPr>
-              <a:t>) are stored with the item’s listing for filtering</a:t>
+              <a:t>Meta-data about each item are stored with the item’s listing for filtering (if applicable)</a:t>
             </a:r>
           </a:p>
         </p:txBody>

</xml_diff>

<commit_message>
Added notebook URL and QR code
</commit_message>
<xml_diff>
--- a/Intro To RAG.pptx
+++ b/Intro To RAG.pptx
@@ -38,7 +38,7 @@
       <p:boldItalic r:id="rId24"/>
     </p:embeddedFont>
     <p:embeddedFont>
-      <p:font typeface="Roboto Mono Light" panose="00000009000000000000" pitchFamily="49" charset="0"/>
+      <p:font typeface="Roboto Mono Light" panose="020F0502020204030204" pitchFamily="49" charset="0"/>
       <p:regular r:id="rId25"/>
       <p:bold r:id="rId26"/>
       <p:italic r:id="rId27"/>
@@ -11399,6 +11399,31 @@
               </a:rPr>
               <a:t> Notebook from: </a:t>
             </a:r>
+            <a:r>
+              <a:rPr lang="en-US" sz="1500" dirty="0">
+                <a:solidFill>
+                  <a:schemeClr val="tx1"/>
+                </a:solidFill>
+                <a:latin typeface="Google Sans"/>
+                <a:ea typeface="Google Sans"/>
+                <a:cs typeface="Google Sans"/>
+                <a:sym typeface="Google Sans"/>
+                <a:hlinkClick r:id="rId2"/>
+              </a:rPr>
+              <a:t>https://shorturl.at/f0kj7</a:t>
+            </a:r>
+            <a:r>
+              <a:rPr lang="en-US" sz="1500" dirty="0">
+                <a:solidFill>
+                  <a:schemeClr val="tx1"/>
+                </a:solidFill>
+                <a:latin typeface="Google Sans"/>
+                <a:ea typeface="Google Sans"/>
+                <a:cs typeface="Google Sans"/>
+                <a:sym typeface="Google Sans"/>
+              </a:rPr>
+              <a:t> </a:t>
+            </a:r>
           </a:p>
           <a:p>
             <a:pPr marL="342900" indent="-342900">
@@ -11454,7 +11479,7 @@
                 <a:ea typeface="Google Sans"/>
                 <a:cs typeface="Google Sans"/>
                 <a:sym typeface="Google Sans"/>
-                <a:hlinkClick r:id="rId2"/>
+                <a:hlinkClick r:id="rId3"/>
               </a:rPr>
               <a:t>https://trygcp.dev/e/build-ai-SHA01</a:t>
             </a:r>
@@ -11628,6 +11653,36 @@
           </a:p>
         </p:txBody>
       </p:sp>
+      <p:pic>
+        <p:nvPicPr>
+          <p:cNvPr id="4" name="Picture 3">
+            <a:extLst>
+              <a:ext uri="{FF2B5EF4-FFF2-40B4-BE49-F238E27FC236}">
+                <a16:creationId xmlns:a16="http://schemas.microsoft.com/office/drawing/2014/main" id="{7AC5A8F3-D20A-5C7D-E89E-C122F56286FA}"/>
+              </a:ext>
+            </a:extLst>
+          </p:cNvPr>
+          <p:cNvPicPr>
+            <a:picLocks noChangeAspect="1"/>
+          </p:cNvPicPr>
+          <p:nvPr/>
+        </p:nvPicPr>
+        <p:blipFill>
+          <a:blip r:embed="rId4"/>
+          <a:stretch>
+            <a:fillRect/>
+          </a:stretch>
+        </p:blipFill>
+        <p:spPr>
+          <a:xfrm>
+            <a:off x="5860955" y="1924945"/>
+            <a:ext cx="2384463" cy="2384463"/>
+          </a:xfrm>
+          <a:prstGeom prst="rect">
+            <a:avLst/>
+          </a:prstGeom>
+        </p:spPr>
+      </p:pic>
     </p:spTree>
     <p:extLst>
       <p:ext uri="{BB962C8B-B14F-4D97-AF65-F5344CB8AC3E}">

</xml_diff>